<commit_message>
Further updates to slides
Added and formatted The Project section
</commit_message>
<xml_diff>
--- a/SAAPI_Walkthrough.pptx
+++ b/SAAPI_Walkthrough.pptx
@@ -10,14 +10,15 @@
     <p:sldId id="260" r:id="rId4"/>
     <p:sldId id="269" r:id="rId5"/>
     <p:sldId id="259" r:id="rId6"/>
-    <p:sldId id="258" r:id="rId7"/>
-    <p:sldId id="261" r:id="rId8"/>
-    <p:sldId id="262" r:id="rId9"/>
-    <p:sldId id="263" r:id="rId10"/>
-    <p:sldId id="265" r:id="rId11"/>
-    <p:sldId id="266" r:id="rId12"/>
-    <p:sldId id="267" r:id="rId13"/>
-    <p:sldId id="268" r:id="rId14"/>
+    <p:sldId id="270" r:id="rId7"/>
+    <p:sldId id="258" r:id="rId8"/>
+    <p:sldId id="261" r:id="rId9"/>
+    <p:sldId id="262" r:id="rId10"/>
+    <p:sldId id="263" r:id="rId11"/>
+    <p:sldId id="265" r:id="rId12"/>
+    <p:sldId id="266" r:id="rId13"/>
+    <p:sldId id="267" r:id="rId14"/>
+    <p:sldId id="268" r:id="rId15"/>
   </p:sldIdLst>
   <p:sldSz cx="9144000" cy="6858000" type="screen4x3"/>
   <p:notesSz cx="6858000" cy="9144000"/>
@@ -322,7 +323,7 @@
           <a:p>
             <a:fld id="{6EA3E9C6-D988-452F-9C00-5DEE413B1A0F}" type="datetimeFigureOut">
               <a:rPr lang="en-CA" smtClean="0"/>
-              <a:t>2014-11-03</a:t>
+              <a:t>03/11/2014</a:t>
             </a:fld>
             <a:endParaRPr lang="en-CA"/>
           </a:p>
@@ -487,7 +488,7 @@
           <a:p>
             <a:fld id="{6EA3E9C6-D988-452F-9C00-5DEE413B1A0F}" type="datetimeFigureOut">
               <a:rPr lang="en-CA" smtClean="0"/>
-              <a:t>2014-11-03</a:t>
+              <a:t>03/11/2014</a:t>
             </a:fld>
             <a:endParaRPr lang="en-CA"/>
           </a:p>
@@ -662,7 +663,7 @@
           <a:p>
             <a:fld id="{6EA3E9C6-D988-452F-9C00-5DEE413B1A0F}" type="datetimeFigureOut">
               <a:rPr lang="en-CA" smtClean="0"/>
-              <a:t>2014-11-03</a:t>
+              <a:t>03/11/2014</a:t>
             </a:fld>
             <a:endParaRPr lang="en-CA"/>
           </a:p>
@@ -827,7 +828,7 @@
           <a:p>
             <a:fld id="{6EA3E9C6-D988-452F-9C00-5DEE413B1A0F}" type="datetimeFigureOut">
               <a:rPr lang="en-CA" smtClean="0"/>
-              <a:t>2014-11-03</a:t>
+              <a:t>03/11/2014</a:t>
             </a:fld>
             <a:endParaRPr lang="en-CA"/>
           </a:p>
@@ -1066,7 +1067,7 @@
           <a:p>
             <a:fld id="{6EA3E9C6-D988-452F-9C00-5DEE413B1A0F}" type="datetimeFigureOut">
               <a:rPr lang="en-CA" smtClean="0"/>
-              <a:t>2014-11-03</a:t>
+              <a:t>03/11/2014</a:t>
             </a:fld>
             <a:endParaRPr lang="en-CA"/>
           </a:p>
@@ -1156,7 +1157,7 @@
           <a:p>
             <a:fld id="{6EA3E9C6-D988-452F-9C00-5DEE413B1A0F}" type="datetimeFigureOut">
               <a:rPr lang="en-CA" smtClean="0"/>
-              <a:t>2014-11-03</a:t>
+              <a:t>03/11/2014</a:t>
             </a:fld>
             <a:endParaRPr lang="en-CA"/>
           </a:p>
@@ -1530,7 +1531,7 @@
           <a:p>
             <a:fld id="{6EA3E9C6-D988-452F-9C00-5DEE413B1A0F}" type="datetimeFigureOut">
               <a:rPr lang="en-CA" smtClean="0"/>
-              <a:t>2014-11-03</a:t>
+              <a:t>03/11/2014</a:t>
             </a:fld>
             <a:endParaRPr lang="en-CA"/>
           </a:p>
@@ -1785,7 +1786,7 @@
           <a:p>
             <a:fld id="{6EA3E9C6-D988-452F-9C00-5DEE413B1A0F}" type="datetimeFigureOut">
               <a:rPr lang="en-CA" smtClean="0"/>
-              <a:t>2014-11-03</a:t>
+              <a:t>03/11/2014</a:t>
             </a:fld>
             <a:endParaRPr lang="en-CA"/>
           </a:p>
@@ -1875,7 +1876,7 @@
           <a:p>
             <a:fld id="{6EA3E9C6-D988-452F-9C00-5DEE413B1A0F}" type="datetimeFigureOut">
               <a:rPr lang="en-CA" smtClean="0"/>
-              <a:t>2014-11-03</a:t>
+              <a:t>03/11/2014</a:t>
             </a:fld>
             <a:endParaRPr lang="en-CA"/>
           </a:p>
@@ -2149,7 +2150,7 @@
           <a:p>
             <a:fld id="{6EA3E9C6-D988-452F-9C00-5DEE413B1A0F}" type="datetimeFigureOut">
               <a:rPr lang="en-CA" smtClean="0"/>
-              <a:t>2014-11-03</a:t>
+              <a:t>03/11/2014</a:t>
             </a:fld>
             <a:endParaRPr lang="en-CA"/>
           </a:p>
@@ -2421,7 +2422,7 @@
           <a:p>
             <a:fld id="{6EA3E9C6-D988-452F-9C00-5DEE413B1A0F}" type="datetimeFigureOut">
               <a:rPr lang="en-CA" smtClean="0"/>
-              <a:t>2014-11-03</a:t>
+              <a:t>03/11/2014</a:t>
             </a:fld>
             <a:endParaRPr lang="en-CA"/>
           </a:p>
@@ -2721,7 +2722,7 @@
           <a:p>
             <a:fld id="{6EA3E9C6-D988-452F-9C00-5DEE413B1A0F}" type="datetimeFigureOut">
               <a:rPr lang="en-CA" smtClean="0"/>
-              <a:t>2014-11-03</a:t>
+              <a:t>03/11/2014</a:t>
             </a:fld>
             <a:endParaRPr lang="en-CA"/>
           </a:p>
@@ -3319,118 +3320,70 @@
             <p:ph type="title"/>
           </p:nvPr>
         </p:nvSpPr>
-        <p:spPr/>
-        <p:txBody>
-          <a:bodyPr/>
-          <a:lstStyle/>
-          <a:p>
+        <p:spPr>
+          <a:xfrm>
+            <a:off x="179512" y="188640"/>
+            <a:ext cx="8856984" cy="722049"/>
+          </a:xfrm>
+        </p:spPr>
+        <p:txBody>
+          <a:bodyPr/>
+          <a:lstStyle/>
+          <a:p>
+            <a:pPr algn="ctr"/>
             <a:r>
               <a:rPr lang="en-CA" dirty="0" smtClean="0"/>
-              <a:t>Non-Functional Requirements</a:t>
+              <a:t>Class Diagram</a:t>
             </a:r>
             <a:endParaRPr lang="en-CA" dirty="0"/>
           </a:p>
         </p:txBody>
       </p:sp>
-      <p:sp>
-        <p:nvSpPr>
-          <p:cNvPr id="3" name="Content Placeholder 2"/>
-          <p:cNvSpPr>
-            <a:spLocks noGrp="1"/>
-          </p:cNvSpPr>
-          <p:nvPr>
-            <p:ph idx="1"/>
-          </p:nvPr>
-        </p:nvSpPr>
-        <p:spPr/>
-        <p:txBody>
-          <a:bodyPr>
-            <a:normAutofit/>
-          </a:bodyPr>
-          <a:lstStyle/>
-          <a:p>
-            <a:r>
-              <a:rPr lang="en-CA" dirty="0" smtClean="0"/>
-              <a:t>Usability</a:t>
-            </a:r>
-          </a:p>
-          <a:p>
-            <a:pPr lvl="1">
-              <a:buFont typeface="Wingdings" pitchFamily="2" charset="2"/>
-              <a:buChar char="Ø"/>
-            </a:pPr>
-            <a:r>
-              <a:rPr lang="en-CA" dirty="0" smtClean="0"/>
-              <a:t>No training required</a:t>
-            </a:r>
-          </a:p>
-          <a:p>
-            <a:pPr lvl="1">
-              <a:buFont typeface="Wingdings" pitchFamily="2" charset="2"/>
-              <a:buChar char="Ø"/>
-            </a:pPr>
-            <a:r>
-              <a:rPr lang="en-CA" dirty="0" smtClean="0"/>
-              <a:t>Interface will be intuitive</a:t>
-            </a:r>
-          </a:p>
-          <a:p>
-            <a:pPr marL="320040" lvl="1" indent="0">
-              <a:buNone/>
-            </a:pPr>
-            <a:endParaRPr lang="en-CA" dirty="0" smtClean="0"/>
-          </a:p>
-          <a:p>
-            <a:r>
-              <a:rPr lang="en-CA" dirty="0" smtClean="0"/>
-              <a:t>Security</a:t>
-            </a:r>
-            <a:endParaRPr lang="en-CA" dirty="0"/>
-          </a:p>
-          <a:p>
-            <a:pPr lvl="1">
-              <a:buFont typeface="Wingdings" pitchFamily="2" charset="2"/>
-              <a:buChar char="Ø"/>
-            </a:pPr>
-            <a:r>
-              <a:rPr lang="en-CA" dirty="0"/>
-              <a:t>All connections are made with HTTPS and SSL, and Parse will reject all non-HTTPS connections, preventing Man-in-the-Middle attacks</a:t>
-            </a:r>
-          </a:p>
-          <a:p>
-            <a:pPr lvl="1">
-              <a:buFont typeface="Wingdings" pitchFamily="2" charset="2"/>
-              <a:buChar char="Ø"/>
-            </a:pPr>
-            <a:r>
-              <a:rPr lang="en-CA" dirty="0"/>
-              <a:t>Application will not be able to update data on the server</a:t>
-            </a:r>
-          </a:p>
-          <a:p>
-            <a:pPr lvl="1">
-              <a:buFont typeface="Wingdings" pitchFamily="2" charset="2"/>
-              <a:buChar char="Ø"/>
-            </a:pPr>
-            <a:r>
-              <a:rPr lang="en-CA" dirty="0" smtClean="0"/>
-              <a:t>Application </a:t>
-            </a:r>
-            <a:r>
-              <a:rPr lang="en-CA" dirty="0"/>
-              <a:t>will ensure only valid </a:t>
-            </a:r>
-            <a:r>
-              <a:rPr lang="en-CA" dirty="0" smtClean="0"/>
-              <a:t>queries</a:t>
-            </a:r>
-          </a:p>
-        </p:txBody>
-      </p:sp>
+      <p:pic>
+        <p:nvPicPr>
+          <p:cNvPr id="1027" name="Picture 3" descr="D:\School\Design SE 4450\pics\class_diagram.png"/>
+          <p:cNvPicPr>
+            <a:picLocks noChangeAspect="1" noChangeArrowheads="1"/>
+          </p:cNvPicPr>
+          <p:nvPr/>
+        </p:nvPicPr>
+        <p:blipFill>
+          <a:blip r:embed="rId2">
+            <a:extLst>
+              <a:ext uri="{28A0092B-C50C-407E-A947-70E740481C1C}">
+                <a14:useLocalDpi xmlns:a14="http://schemas.microsoft.com/office/drawing/2010/main" val="0"/>
+              </a:ext>
+            </a:extLst>
+          </a:blip>
+          <a:srcRect/>
+          <a:stretch>
+            <a:fillRect/>
+          </a:stretch>
+        </p:blipFill>
+        <p:spPr bwMode="auto">
+          <a:xfrm>
+            <a:off x="506395" y="1196751"/>
+            <a:ext cx="7992888" cy="5287495"/>
+          </a:xfrm>
+          <a:prstGeom prst="rect">
+            <a:avLst/>
+          </a:prstGeom>
+          <a:noFill/>
+          <a:extLst>
+            <a:ext uri="{909E8E84-426E-40DD-AFC4-6F175D3DCCD1}">
+              <a14:hiddenFill xmlns:a14="http://schemas.microsoft.com/office/drawing/2010/main">
+                <a:solidFill>
+                  <a:srgbClr val="FFFFFF"/>
+                </a:solidFill>
+              </a14:hiddenFill>
+            </a:ext>
+          </a:extLst>
+        </p:spPr>
+      </p:pic>
     </p:spTree>
     <p:extLst>
       <p:ext uri="{BB962C8B-B14F-4D97-AF65-F5344CB8AC3E}">
-        <p14:creationId xmlns:p14="http://schemas.microsoft.com/office/powerpoint/2010/main" val="1064775156"/>
+        <p14:creationId xmlns:p14="http://schemas.microsoft.com/office/powerpoint/2010/main" val="1319208962"/>
       </p:ext>
     </p:extLst>
   </p:cSld>
@@ -3499,7 +3452,7 @@
           <a:p>
             <a:r>
               <a:rPr lang="en-CA" dirty="0" smtClean="0"/>
-              <a:t>Scalability</a:t>
+              <a:t>Usability</a:t>
             </a:r>
           </a:p>
           <a:p>
@@ -3508,12 +3461,8 @@
               <a:buChar char="Ø"/>
             </a:pPr>
             <a:r>
-              <a:rPr lang="en-CA" dirty="0"/>
-              <a:t>In 2012, Parse announced more than 10,000 applications running on their platform with a 40% month-over-month growth </a:t>
-            </a:r>
-            <a:r>
               <a:rPr lang="en-CA" dirty="0" smtClean="0"/>
-              <a:t>rate</a:t>
+              <a:t>No training required</a:t>
             </a:r>
           </a:p>
           <a:p>
@@ -3523,7 +3472,7 @@
             </a:pPr>
             <a:r>
               <a:rPr lang="en-CA" dirty="0" smtClean="0"/>
-              <a:t>Currently used by Cisco, Cadillac, food Network, etc.</a:t>
+              <a:t>Interface will be intuitive</a:t>
             </a:r>
           </a:p>
           <a:p>
@@ -3533,14 +3482,11 @@
             <a:endParaRPr lang="en-CA" dirty="0" smtClean="0"/>
           </a:p>
           <a:p>
-            <a:pPr>
-              <a:buFont typeface="Wingdings" pitchFamily="2" charset="2"/>
-              <a:buChar char="§"/>
-            </a:pPr>
-            <a:r>
-              <a:rPr lang="en-CA" dirty="0"/>
-              <a:t>Performance</a:t>
-            </a:r>
+            <a:r>
+              <a:rPr lang="en-CA" dirty="0" smtClean="0"/>
+              <a:t>Security</a:t>
+            </a:r>
+            <a:endParaRPr lang="en-CA" dirty="0"/>
           </a:p>
           <a:p>
             <a:pPr lvl="1">
@@ -3549,42 +3495,43 @@
             </a:pPr>
             <a:r>
               <a:rPr lang="en-CA" dirty="0"/>
-              <a:t>All users will be able to view </a:t>
-            </a:r>
+              <a:t>All connections are made with HTTPS and SSL, and Parse will reject all non-HTTPS connections, preventing Man-in-the-Middle attacks</a:t>
+            </a:r>
+          </a:p>
+          <a:p>
+            <a:pPr lvl="1">
+              <a:buFont typeface="Wingdings" pitchFamily="2" charset="2"/>
+              <a:buChar char="Ø"/>
+            </a:pPr>
+            <a:r>
+              <a:rPr lang="en-CA" dirty="0"/>
+              <a:t>Application will not be able to update data on the server</a:t>
+            </a:r>
+          </a:p>
+          <a:p>
+            <a:pPr lvl="1">
+              <a:buFont typeface="Wingdings" pitchFamily="2" charset="2"/>
+              <a:buChar char="Ø"/>
+            </a:pPr>
             <a:r>
               <a:rPr lang="en-CA" dirty="0" smtClean="0"/>
-              <a:t>all user </a:t>
+              <a:t>Application </a:t>
             </a:r>
             <a:r>
               <a:rPr lang="en-CA" dirty="0"/>
-              <a:t>information within 5</a:t>
+              <a:t>will ensure only valid </a:t>
             </a:r>
             <a:r>
               <a:rPr lang="en-CA" dirty="0" smtClean="0"/>
-              <a:t> </a:t>
-            </a:r>
-            <a:r>
-              <a:rPr lang="en-CA" dirty="0"/>
-              <a:t>seconds after </a:t>
-            </a:r>
-            <a:r>
-              <a:rPr lang="en-CA" dirty="0" smtClean="0"/>
-              <a:t>logging in</a:t>
-            </a:r>
-            <a:endParaRPr lang="en-CA" dirty="0"/>
-          </a:p>
-          <a:p>
-            <a:pPr marL="320040" lvl="1" indent="0">
-              <a:buNone/>
-            </a:pPr>
-            <a:endParaRPr lang="en-CA" dirty="0"/>
+              <a:t>queries</a:t>
+            </a:r>
           </a:p>
         </p:txBody>
       </p:sp>
     </p:spTree>
     <p:extLst>
       <p:ext uri="{BB962C8B-B14F-4D97-AF65-F5344CB8AC3E}">
-        <p14:creationId xmlns:p14="http://schemas.microsoft.com/office/powerpoint/2010/main" val="1673183732"/>
+        <p14:creationId xmlns:p14="http://schemas.microsoft.com/office/powerpoint/2010/main" val="1064775156"/>
       </p:ext>
     </p:extLst>
   </p:cSld>
@@ -3628,6 +3575,160 @@
           <a:p>
             <a:r>
               <a:rPr lang="en-CA" dirty="0" smtClean="0"/>
+              <a:t>Non-Functional Requirements</a:t>
+            </a:r>
+            <a:endParaRPr lang="en-CA" dirty="0"/>
+          </a:p>
+        </p:txBody>
+      </p:sp>
+      <p:sp>
+        <p:nvSpPr>
+          <p:cNvPr id="3" name="Content Placeholder 2"/>
+          <p:cNvSpPr>
+            <a:spLocks noGrp="1"/>
+          </p:cNvSpPr>
+          <p:nvPr>
+            <p:ph idx="1"/>
+          </p:nvPr>
+        </p:nvSpPr>
+        <p:spPr/>
+        <p:txBody>
+          <a:bodyPr>
+            <a:normAutofit/>
+          </a:bodyPr>
+          <a:lstStyle/>
+          <a:p>
+            <a:r>
+              <a:rPr lang="en-CA" dirty="0" smtClean="0"/>
+              <a:t>Scalability</a:t>
+            </a:r>
+          </a:p>
+          <a:p>
+            <a:pPr lvl="1">
+              <a:buFont typeface="Wingdings" pitchFamily="2" charset="2"/>
+              <a:buChar char="Ø"/>
+            </a:pPr>
+            <a:r>
+              <a:rPr lang="en-CA" dirty="0"/>
+              <a:t>In 2012, Parse announced more than 10,000 applications running on their platform with a 40% month-over-month growth </a:t>
+            </a:r>
+            <a:r>
+              <a:rPr lang="en-CA" dirty="0" smtClean="0"/>
+              <a:t>rate</a:t>
+            </a:r>
+          </a:p>
+          <a:p>
+            <a:pPr lvl="1">
+              <a:buFont typeface="Wingdings" pitchFamily="2" charset="2"/>
+              <a:buChar char="Ø"/>
+            </a:pPr>
+            <a:r>
+              <a:rPr lang="en-CA" dirty="0" smtClean="0"/>
+              <a:t>Currently used by Cisco, Cadillac, food Network, etc.</a:t>
+            </a:r>
+          </a:p>
+          <a:p>
+            <a:pPr marL="320040" lvl="1" indent="0">
+              <a:buNone/>
+            </a:pPr>
+            <a:endParaRPr lang="en-CA" dirty="0" smtClean="0"/>
+          </a:p>
+          <a:p>
+            <a:pPr>
+              <a:buFont typeface="Wingdings" pitchFamily="2" charset="2"/>
+              <a:buChar char="§"/>
+            </a:pPr>
+            <a:r>
+              <a:rPr lang="en-CA" dirty="0"/>
+              <a:t>Performance</a:t>
+            </a:r>
+          </a:p>
+          <a:p>
+            <a:pPr lvl="1">
+              <a:buFont typeface="Wingdings" pitchFamily="2" charset="2"/>
+              <a:buChar char="Ø"/>
+            </a:pPr>
+            <a:r>
+              <a:rPr lang="en-CA" dirty="0"/>
+              <a:t>All users will be able to view </a:t>
+            </a:r>
+            <a:r>
+              <a:rPr lang="en-CA" dirty="0" smtClean="0"/>
+              <a:t>all user </a:t>
+            </a:r>
+            <a:r>
+              <a:rPr lang="en-CA" dirty="0"/>
+              <a:t>information within 5</a:t>
+            </a:r>
+            <a:r>
+              <a:rPr lang="en-CA" dirty="0" smtClean="0"/>
+              <a:t> </a:t>
+            </a:r>
+            <a:r>
+              <a:rPr lang="en-CA" dirty="0"/>
+              <a:t>seconds after </a:t>
+            </a:r>
+            <a:r>
+              <a:rPr lang="en-CA" dirty="0" smtClean="0"/>
+              <a:t>logging in</a:t>
+            </a:r>
+            <a:endParaRPr lang="en-CA" dirty="0"/>
+          </a:p>
+          <a:p>
+            <a:pPr marL="320040" lvl="1" indent="0">
+              <a:buNone/>
+            </a:pPr>
+            <a:endParaRPr lang="en-CA" dirty="0"/>
+          </a:p>
+        </p:txBody>
+      </p:sp>
+    </p:spTree>
+    <p:extLst>
+      <p:ext uri="{BB962C8B-B14F-4D97-AF65-F5344CB8AC3E}">
+        <p14:creationId xmlns:p14="http://schemas.microsoft.com/office/powerpoint/2010/main" val="1673183732"/>
+      </p:ext>
+    </p:extLst>
+  </p:cSld>
+  <p:clrMapOvr>
+    <a:masterClrMapping/>
+  </p:clrMapOvr>
+</p:sld>
+</file>
+
+<file path=ppt/slides/slide13.xml><?xml version="1.0" encoding="utf-8"?>
+<p:sld xmlns:a="http://schemas.openxmlformats.org/drawingml/2006/main" xmlns:r="http://schemas.openxmlformats.org/officeDocument/2006/relationships" xmlns:p="http://schemas.openxmlformats.org/presentationml/2006/main">
+  <p:cSld>
+    <p:spTree>
+      <p:nvGrpSpPr>
+        <p:cNvPr id="1" name=""/>
+        <p:cNvGrpSpPr/>
+        <p:nvPr/>
+      </p:nvGrpSpPr>
+      <p:grpSpPr>
+        <a:xfrm>
+          <a:off x="0" y="0"/>
+          <a:ext cx="0" cy="0"/>
+          <a:chOff x="0" y="0"/>
+          <a:chExt cx="0" cy="0"/>
+        </a:xfrm>
+      </p:grpSpPr>
+      <p:sp>
+        <p:nvSpPr>
+          <p:cNvPr id="2" name="Title 1"/>
+          <p:cNvSpPr>
+            <a:spLocks noGrp="1"/>
+          </p:cNvSpPr>
+          <p:nvPr>
+            <p:ph type="title"/>
+          </p:nvPr>
+        </p:nvSpPr>
+        <p:spPr/>
+        <p:txBody>
+          <a:bodyPr/>
+          <a:lstStyle/>
+          <a:p>
+            <a:r>
+              <a:rPr lang="en-CA" dirty="0" smtClean="0"/>
               <a:t>Screenshots</a:t>
             </a:r>
             <a:endParaRPr lang="en-CA" dirty="0"/>
@@ -3666,7 +3767,7 @@
 </p:sld>
 </file>
 
-<file path=ppt/slides/slide13.xml><?xml version="1.0" encoding="utf-8"?>
+<file path=ppt/slides/slide14.xml><?xml version="1.0" encoding="utf-8"?>
 <p:sld xmlns:a="http://schemas.openxmlformats.org/drawingml/2006/main" xmlns:r="http://schemas.openxmlformats.org/officeDocument/2006/relationships" xmlns:p="http://schemas.openxmlformats.org/presentationml/2006/main">
   <p:cSld>
     <p:spTree>
@@ -3851,12 +3952,25 @@
               <a:rPr lang="en-CA" dirty="0" smtClean="0"/>
               <a:t>Study by the Genomics lab at the University Hospital </a:t>
             </a:r>
+            <a:endParaRPr lang="en-CA" dirty="0" smtClean="0"/>
+          </a:p>
+          <a:p>
+            <a:endParaRPr lang="en-CA" dirty="0" smtClean="0"/>
           </a:p>
           <a:p>
             <a:r>
               <a:rPr lang="en-CA" dirty="0" smtClean="0"/>
-              <a:t>Doctors wanted a mobile solution to securely send patient information</a:t>
-            </a:r>
+              <a:t>Doctors wanted a mobile solution to securely send patient </a:t>
+            </a:r>
+            <a:r>
+              <a:rPr lang="en-CA" dirty="0" smtClean="0"/>
+              <a:t>information</a:t>
+            </a:r>
+          </a:p>
+          <a:p>
+            <a:endParaRPr lang="en-CA" dirty="0"/>
+          </a:p>
+          <a:p>
             <a:endParaRPr lang="en-CA" dirty="0"/>
           </a:p>
         </p:txBody>
@@ -4174,28 +4288,58 @@
         </p:nvSpPr>
         <p:spPr/>
         <p:txBody>
-          <a:bodyPr/>
+          <a:bodyPr>
+            <a:normAutofit/>
+          </a:bodyPr>
           <a:lstStyle/>
           <a:p>
             <a:r>
               <a:rPr lang="en-CA" dirty="0" smtClean="0"/>
-              <a:t>Mobile solution to allow patients to view their prescription information</a:t>
-            </a:r>
-          </a:p>
-          <a:p>
+              <a:t>Mobile solution to allow patients to view their prescription </a:t>
+            </a:r>
             <a:r>
               <a:rPr lang="en-CA" dirty="0" smtClean="0"/>
-              <a:t>Will allow doctors to concentrate time more on work than informing patients</a:t>
-            </a:r>
+              <a:t>information</a:t>
+            </a:r>
+          </a:p>
+          <a:p>
+            <a:endParaRPr lang="en-CA" dirty="0" smtClean="0"/>
           </a:p>
           <a:p>
             <a:r>
               <a:rPr lang="en-CA" dirty="0" smtClean="0"/>
-              <a:t>Requires high level of security to ensure secrecy for patients</a:t>
-            </a:r>
-          </a:p>
-          <a:p>
-            <a:endParaRPr lang="en-CA" dirty="0"/>
+              <a:t>Will allow doctors to concentrate time more on work than informing </a:t>
+            </a:r>
+            <a:r>
+              <a:rPr lang="en-CA" dirty="0" smtClean="0"/>
+              <a:t>patients</a:t>
+            </a:r>
+          </a:p>
+          <a:p>
+            <a:endParaRPr lang="en-CA" dirty="0" smtClean="0"/>
+          </a:p>
+          <a:p>
+            <a:r>
+              <a:rPr lang="en-CA" dirty="0" smtClean="0"/>
+              <a:t>Create mock database based on </a:t>
+            </a:r>
+            <a:r>
+              <a:rPr lang="en-CA" smtClean="0"/>
+              <a:t>hospitals structure</a:t>
+            </a:r>
+          </a:p>
+          <a:p>
+            <a:endParaRPr lang="en-CA" dirty="0" smtClean="0"/>
+          </a:p>
+          <a:p>
+            <a:r>
+              <a:rPr lang="en-CA" dirty="0" smtClean="0"/>
+              <a:t>Requires high level of security to ensure secrecy for </a:t>
+            </a:r>
+            <a:r>
+              <a:rPr lang="en-CA" dirty="0" smtClean="0"/>
+              <a:t>patients</a:t>
+            </a:r>
           </a:p>
         </p:txBody>
       </p:sp>
@@ -4213,6 +4357,110 @@
 </file>
 
 <file path=ppt/slides/slide6.xml><?xml version="1.0" encoding="utf-8"?>
+<p:sld xmlns:a="http://schemas.openxmlformats.org/drawingml/2006/main" xmlns:r="http://schemas.openxmlformats.org/officeDocument/2006/relationships" xmlns:p="http://schemas.openxmlformats.org/presentationml/2006/main">
+  <p:cSld>
+    <p:spTree>
+      <p:nvGrpSpPr>
+        <p:cNvPr id="1" name=""/>
+        <p:cNvGrpSpPr/>
+        <p:nvPr/>
+      </p:nvGrpSpPr>
+      <p:grpSpPr>
+        <a:xfrm>
+          <a:off x="0" y="0"/>
+          <a:ext cx="0" cy="0"/>
+          <a:chOff x="0" y="0"/>
+          <a:chExt cx="0" cy="0"/>
+        </a:xfrm>
+      </p:grpSpPr>
+      <p:sp>
+        <p:nvSpPr>
+          <p:cNvPr id="2" name="Title 1"/>
+          <p:cNvSpPr>
+            <a:spLocks noGrp="1"/>
+          </p:cNvSpPr>
+          <p:nvPr>
+            <p:ph type="title"/>
+          </p:nvPr>
+        </p:nvSpPr>
+        <p:spPr/>
+        <p:txBody>
+          <a:bodyPr/>
+          <a:lstStyle/>
+          <a:p>
+            <a:r>
+              <a:rPr lang="en-US" dirty="0" smtClean="0"/>
+              <a:t>The Project</a:t>
+            </a:r>
+            <a:endParaRPr lang="en-US" dirty="0"/>
+          </a:p>
+        </p:txBody>
+      </p:sp>
+      <p:sp>
+        <p:nvSpPr>
+          <p:cNvPr id="3" name="Content Placeholder 2"/>
+          <p:cNvSpPr>
+            <a:spLocks noGrp="1"/>
+          </p:cNvSpPr>
+          <p:nvPr>
+            <p:ph idx="1"/>
+          </p:nvPr>
+        </p:nvSpPr>
+        <p:spPr/>
+        <p:txBody>
+          <a:bodyPr/>
+          <a:lstStyle/>
+          <a:p>
+            <a:r>
+              <a:rPr lang="en-CA" dirty="0"/>
+              <a:t>Implement security measures at both backend and application </a:t>
+            </a:r>
+            <a:r>
+              <a:rPr lang="en-CA" dirty="0" smtClean="0"/>
+              <a:t>levels</a:t>
+            </a:r>
+          </a:p>
+          <a:p>
+            <a:endParaRPr lang="en-CA" dirty="0"/>
+          </a:p>
+          <a:p>
+            <a:r>
+              <a:rPr lang="en-CA" dirty="0"/>
+              <a:t>Proof of concept for funding deployable </a:t>
+            </a:r>
+            <a:r>
+              <a:rPr lang="en-CA" dirty="0" smtClean="0"/>
+              <a:t>system</a:t>
+            </a:r>
+          </a:p>
+          <a:p>
+            <a:endParaRPr lang="en-CA" dirty="0"/>
+          </a:p>
+          <a:p>
+            <a:r>
+              <a:rPr lang="en-CA" dirty="0"/>
+              <a:t>Security requirements for accessing actual hospital database beyond scale of assignment</a:t>
+            </a:r>
+          </a:p>
+          <a:p>
+            <a:endParaRPr lang="en-US" dirty="0"/>
+          </a:p>
+        </p:txBody>
+      </p:sp>
+    </p:spTree>
+    <p:extLst>
+      <p:ext uri="{BB962C8B-B14F-4D97-AF65-F5344CB8AC3E}">
+        <p14:creationId xmlns:p14="http://schemas.microsoft.com/office/powerpoint/2010/main" val="4140784993"/>
+      </p:ext>
+    </p:extLst>
+  </p:cSld>
+  <p:clrMapOvr>
+    <a:masterClrMapping/>
+  </p:clrMapOvr>
+</p:sld>
+</file>
+
+<file path=ppt/slides/slide7.xml><?xml version="1.0" encoding="utf-8"?>
 <p:sld xmlns:a="http://schemas.openxmlformats.org/drawingml/2006/main" xmlns:r="http://schemas.openxmlformats.org/officeDocument/2006/relationships" xmlns:p="http://schemas.openxmlformats.org/presentationml/2006/main">
   <p:cSld>
     <p:spTree>
@@ -4482,118 +4730,6 @@
 </p:sld>
 </file>
 
-<file path=ppt/slides/slide7.xml><?xml version="1.0" encoding="utf-8"?>
-<p:sld xmlns:a="http://schemas.openxmlformats.org/drawingml/2006/main" xmlns:r="http://schemas.openxmlformats.org/officeDocument/2006/relationships" xmlns:p="http://schemas.openxmlformats.org/presentationml/2006/main">
-  <p:cSld>
-    <p:spTree>
-      <p:nvGrpSpPr>
-        <p:cNvPr id="1" name=""/>
-        <p:cNvGrpSpPr/>
-        <p:nvPr/>
-      </p:nvGrpSpPr>
-      <p:grpSpPr>
-        <a:xfrm>
-          <a:off x="0" y="0"/>
-          <a:ext cx="0" cy="0"/>
-          <a:chOff x="0" y="0"/>
-          <a:chExt cx="0" cy="0"/>
-        </a:xfrm>
-      </p:grpSpPr>
-      <p:sp>
-        <p:nvSpPr>
-          <p:cNvPr id="2" name="Title 1"/>
-          <p:cNvSpPr>
-            <a:spLocks noGrp="1"/>
-          </p:cNvSpPr>
-          <p:nvPr>
-            <p:ph type="title"/>
-          </p:nvPr>
-        </p:nvSpPr>
-        <p:spPr/>
-        <p:txBody>
-          <a:bodyPr/>
-          <a:lstStyle/>
-          <a:p>
-            <a:r>
-              <a:rPr lang="en-CA" dirty="0" smtClean="0"/>
-              <a:t>Functional Requirements</a:t>
-            </a:r>
-            <a:endParaRPr lang="en-CA" dirty="0"/>
-          </a:p>
-        </p:txBody>
-      </p:sp>
-      <p:sp>
-        <p:nvSpPr>
-          <p:cNvPr id="3" name="Content Placeholder 2"/>
-          <p:cNvSpPr>
-            <a:spLocks noGrp="1"/>
-          </p:cNvSpPr>
-          <p:nvPr>
-            <p:ph idx="1"/>
-          </p:nvPr>
-        </p:nvSpPr>
-        <p:spPr/>
-        <p:txBody>
-          <a:bodyPr/>
-          <a:lstStyle/>
-          <a:p>
-            <a:r>
-              <a:rPr lang="en-CA" dirty="0" smtClean="0"/>
-              <a:t>Display various user information (name, age, gender, prescription, dosage)</a:t>
-            </a:r>
-          </a:p>
-          <a:p>
-            <a:r>
-              <a:rPr lang="en-CA" dirty="0" smtClean="0"/>
-              <a:t>Display maximum dosage for either atorvastatin or rosuvastatin if the patient is taking one of them</a:t>
-            </a:r>
-          </a:p>
-          <a:p>
-            <a:r>
-              <a:rPr lang="en-CA" dirty="0" smtClean="0"/>
-              <a:t>Connect to database to update local data</a:t>
-            </a:r>
-          </a:p>
-          <a:p>
-            <a:r>
-              <a:rPr lang="en-CA" dirty="0" smtClean="0"/>
-              <a:t>Notify user of missing internet connection</a:t>
-            </a:r>
-          </a:p>
-          <a:p>
-            <a:r>
-              <a:rPr lang="en-CA" dirty="0" smtClean="0"/>
-              <a:t>Display messages from doctor</a:t>
-            </a:r>
-          </a:p>
-          <a:p>
-            <a:r>
-              <a:rPr lang="en-CA" dirty="0" smtClean="0"/>
-              <a:t>Send push notification when doctor sends a message</a:t>
-            </a:r>
-          </a:p>
-          <a:p>
-            <a:r>
-              <a:rPr lang="en-CA" dirty="0" smtClean="0"/>
-              <a:t>Provide secure authentication at login </a:t>
-            </a:r>
-            <a:endParaRPr lang="en-CA" dirty="0"/>
-          </a:p>
-        </p:txBody>
-      </p:sp>
-    </p:spTree>
-    <p:extLst>
-      <p:ext uri="{BB962C8B-B14F-4D97-AF65-F5344CB8AC3E}">
-        <p14:creationId xmlns:p14="http://schemas.microsoft.com/office/powerpoint/2010/main" val="2451032294"/>
-      </p:ext>
-    </p:extLst>
-  </p:cSld>
-  <p:clrMapOvr>
-    <a:masterClrMapping/>
-  </p:clrMapOvr>
-</p:sld>
-</file>
-
 <file path=ppt/slides/slide8.xml><?xml version="1.0" encoding="utf-8"?>
 <p:sld xmlns:a="http://schemas.openxmlformats.org/drawingml/2006/main" xmlns:r="http://schemas.openxmlformats.org/officeDocument/2006/relationships" xmlns:p="http://schemas.openxmlformats.org/presentationml/2006/main">
   <p:cSld>
@@ -4621,57 +4757,82 @@
             <p:ph type="title"/>
           </p:nvPr>
         </p:nvSpPr>
-        <p:spPr>
-          <a:xfrm>
-            <a:off x="914399" y="260648"/>
-            <a:ext cx="7315200" cy="794057"/>
-          </a:xfrm>
-        </p:spPr>
-        <p:txBody>
-          <a:bodyPr>
-            <a:normAutofit/>
-          </a:bodyPr>
-          <a:lstStyle/>
-          <a:p>
-            <a:pPr algn="ctr"/>
+        <p:spPr/>
+        <p:txBody>
+          <a:bodyPr/>
+          <a:lstStyle/>
+          <a:p>
             <a:r>
               <a:rPr lang="en-CA" dirty="0" smtClean="0"/>
-              <a:t>Use Case Diagram</a:t>
+              <a:t>Functional Requirements</a:t>
             </a:r>
             <a:endParaRPr lang="en-CA" dirty="0"/>
           </a:p>
         </p:txBody>
       </p:sp>
-      <p:pic>
-        <p:nvPicPr>
-          <p:cNvPr id="4" name="Content Placeholder 3"/>
-          <p:cNvPicPr>
-            <a:picLocks noGrp="1" noChangeAspect="1"/>
-          </p:cNvPicPr>
+      <p:sp>
+        <p:nvSpPr>
+          <p:cNvPr id="3" name="Content Placeholder 2"/>
+          <p:cNvSpPr>
+            <a:spLocks noGrp="1"/>
+          </p:cNvSpPr>
           <p:nvPr>
             <p:ph idx="1"/>
           </p:nvPr>
-        </p:nvPicPr>
-        <p:blipFill>
-          <a:blip r:embed="rId2"/>
-          <a:stretch>
-            <a:fillRect/>
-          </a:stretch>
-        </p:blipFill>
-        <p:spPr>
-          <a:xfrm>
-            <a:off x="1148140" y="1412776"/>
-            <a:ext cx="6847717" cy="5111973"/>
-          </a:xfrm>
-          <a:prstGeom prst="rect">
-            <a:avLst/>
-          </a:prstGeom>
-        </p:spPr>
-      </p:pic>
+        </p:nvSpPr>
+        <p:spPr/>
+        <p:txBody>
+          <a:bodyPr/>
+          <a:lstStyle/>
+          <a:p>
+            <a:r>
+              <a:rPr lang="en-CA" dirty="0" smtClean="0"/>
+              <a:t>Display various user information (name, age, gender, prescription, dosage)</a:t>
+            </a:r>
+          </a:p>
+          <a:p>
+            <a:r>
+              <a:rPr lang="en-CA" dirty="0" smtClean="0"/>
+              <a:t>Display maximum dosage for either atorvastatin or rosuvastatin if the patient is taking one of them</a:t>
+            </a:r>
+          </a:p>
+          <a:p>
+            <a:r>
+              <a:rPr lang="en-CA" dirty="0" smtClean="0"/>
+              <a:t>Connect to database to update local data</a:t>
+            </a:r>
+          </a:p>
+          <a:p>
+            <a:r>
+              <a:rPr lang="en-CA" dirty="0" smtClean="0"/>
+              <a:t>Notify user of missing internet connection</a:t>
+            </a:r>
+          </a:p>
+          <a:p>
+            <a:r>
+              <a:rPr lang="en-CA" dirty="0" smtClean="0"/>
+              <a:t>Display messages from doctor</a:t>
+            </a:r>
+          </a:p>
+          <a:p>
+            <a:r>
+              <a:rPr lang="en-CA" dirty="0" smtClean="0"/>
+              <a:t>Send push notification when doctor sends a message</a:t>
+            </a:r>
+          </a:p>
+          <a:p>
+            <a:r>
+              <a:rPr lang="en-CA" dirty="0" smtClean="0"/>
+              <a:t>Provide secure authentication at login </a:t>
+            </a:r>
+            <a:endParaRPr lang="en-CA" dirty="0"/>
+          </a:p>
+        </p:txBody>
+      </p:sp>
     </p:spTree>
     <p:extLst>
       <p:ext uri="{BB962C8B-B14F-4D97-AF65-F5344CB8AC3E}">
-        <p14:creationId xmlns:p14="http://schemas.microsoft.com/office/powerpoint/2010/main" val="3621313620"/>
+        <p14:creationId xmlns:p14="http://schemas.microsoft.com/office/powerpoint/2010/main" val="2451032294"/>
       </p:ext>
     </p:extLst>
   </p:cSld>
@@ -4710,18 +4871,20 @@
         </p:nvSpPr>
         <p:spPr>
           <a:xfrm>
-            <a:off x="179512" y="188640"/>
-            <a:ext cx="8856984" cy="722049"/>
+            <a:off x="914399" y="260648"/>
+            <a:ext cx="7315200" cy="794057"/>
           </a:xfrm>
         </p:spPr>
         <p:txBody>
-          <a:bodyPr/>
+          <a:bodyPr>
+            <a:normAutofit/>
+          </a:bodyPr>
           <a:lstStyle/>
           <a:p>
             <a:pPr algn="ctr"/>
             <a:r>
               <a:rPr lang="en-CA" dirty="0" smtClean="0"/>
-              <a:t>Class Diagram</a:t>
+              <a:t>Use Case Diagram</a:t>
             </a:r>
             <a:endParaRPr lang="en-CA" dirty="0"/>
           </a:p>
@@ -4729,49 +4892,34 @@
       </p:sp>
       <p:pic>
         <p:nvPicPr>
-          <p:cNvPr id="1027" name="Picture 3" descr="D:\School\Design SE 4450\pics\class_diagram.png"/>
+          <p:cNvPr id="4" name="Content Placeholder 3"/>
           <p:cNvPicPr>
-            <a:picLocks noChangeAspect="1" noChangeArrowheads="1"/>
+            <a:picLocks noGrp="1" noChangeAspect="1"/>
           </p:cNvPicPr>
-          <p:nvPr/>
+          <p:nvPr>
+            <p:ph idx="1"/>
+          </p:nvPr>
         </p:nvPicPr>
         <p:blipFill>
-          <a:blip r:embed="rId2">
-            <a:extLst>
-              <a:ext uri="{28A0092B-C50C-407E-A947-70E740481C1C}">
-                <a14:useLocalDpi xmlns:a14="http://schemas.microsoft.com/office/drawing/2010/main" val="0"/>
-              </a:ext>
-            </a:extLst>
-          </a:blip>
-          <a:srcRect/>
+          <a:blip r:embed="rId2"/>
           <a:stretch>
             <a:fillRect/>
           </a:stretch>
         </p:blipFill>
-        <p:spPr bwMode="auto">
+        <p:spPr>
           <a:xfrm>
-            <a:off x="506395" y="1196751"/>
-            <a:ext cx="7992888" cy="5287495"/>
+            <a:off x="1148140" y="1412776"/>
+            <a:ext cx="6847717" cy="5111973"/>
           </a:xfrm>
           <a:prstGeom prst="rect">
             <a:avLst/>
           </a:prstGeom>
-          <a:noFill/>
-          <a:extLst>
-            <a:ext uri="{909E8E84-426E-40DD-AFC4-6F175D3DCCD1}">
-              <a14:hiddenFill xmlns:a14="http://schemas.microsoft.com/office/drawing/2010/main">
-                <a:solidFill>
-                  <a:srgbClr val="FFFFFF"/>
-                </a:solidFill>
-              </a14:hiddenFill>
-            </a:ext>
-          </a:extLst>
         </p:spPr>
       </p:pic>
     </p:spTree>
     <p:extLst>
       <p:ext uri="{BB962C8B-B14F-4D97-AF65-F5344CB8AC3E}">
-        <p14:creationId xmlns:p14="http://schemas.microsoft.com/office/powerpoint/2010/main" val="1319208962"/>
+        <p14:creationId xmlns:p14="http://schemas.microsoft.com/office/powerpoint/2010/main" val="3621313620"/>
       </p:ext>
     </p:extLst>
   </p:cSld>

</xml_diff>

<commit_message>
Added screenshots to slides
</commit_message>
<xml_diff>
--- a/SAAPI_Walkthrough.pptx
+++ b/SAAPI_Walkthrough.pptx
@@ -3722,7 +3722,12 @@
             <p:ph type="title"/>
           </p:nvPr>
         </p:nvSpPr>
-        <p:spPr/>
+        <p:spPr>
+          <a:xfrm>
+            <a:off x="882445" y="116632"/>
+            <a:ext cx="7315200" cy="1154097"/>
+          </a:xfrm>
+        </p:spPr>
         <p:txBody>
           <a:bodyPr/>
           <a:lstStyle/>
@@ -3735,25 +3740,129 @@
           </a:p>
         </p:txBody>
       </p:sp>
-      <p:sp>
-        <p:nvSpPr>
-          <p:cNvPr id="3" name="Content Placeholder 2"/>
-          <p:cNvSpPr>
-            <a:spLocks noGrp="1"/>
-          </p:cNvSpPr>
-          <p:nvPr>
-            <p:ph idx="1"/>
-          </p:nvPr>
-        </p:nvSpPr>
-        <p:spPr/>
-        <p:txBody>
-          <a:bodyPr/>
-          <a:lstStyle/>
-          <a:p>
-            <a:endParaRPr lang="en-CA"/>
-          </a:p>
-        </p:txBody>
-      </p:sp>
+      <p:pic>
+        <p:nvPicPr>
+          <p:cNvPr id="4" name="Picture 3" descr="D:\School\Design SE 4450\pics\screenshot1.png"/>
+          <p:cNvPicPr>
+            <a:picLocks noChangeAspect="1" noChangeArrowheads="1"/>
+          </p:cNvPicPr>
+          <p:nvPr/>
+        </p:nvPicPr>
+        <p:blipFill>
+          <a:blip r:embed="rId2">
+            <a:extLst>
+              <a:ext uri="{28A0092B-C50C-407E-A947-70E740481C1C}">
+                <a14:useLocalDpi xmlns:a14="http://schemas.microsoft.com/office/drawing/2010/main" val="0"/>
+              </a:ext>
+            </a:extLst>
+          </a:blip>
+          <a:srcRect/>
+          <a:stretch>
+            <a:fillRect/>
+          </a:stretch>
+        </p:blipFill>
+        <p:spPr bwMode="auto">
+          <a:xfrm>
+            <a:off x="395536" y="1988840"/>
+            <a:ext cx="2393313" cy="4557886"/>
+          </a:xfrm>
+          <a:prstGeom prst="rect">
+            <a:avLst/>
+          </a:prstGeom>
+          <a:noFill/>
+          <a:extLst>
+            <a:ext uri="{909E8E84-426E-40DD-AFC4-6F175D3DCCD1}">
+              <a14:hiddenFill xmlns:a14="http://schemas.microsoft.com/office/drawing/2010/main">
+                <a:solidFill>
+                  <a:srgbClr val="FFFFFF"/>
+                </a:solidFill>
+              </a14:hiddenFill>
+            </a:ext>
+          </a:extLst>
+        </p:spPr>
+      </p:pic>
+      <p:pic>
+        <p:nvPicPr>
+          <p:cNvPr id="5" name="Picture 4" descr="D:\School\Design SE 4450\pics\screenshot2.png"/>
+          <p:cNvPicPr>
+            <a:picLocks noChangeAspect="1" noChangeArrowheads="1"/>
+          </p:cNvPicPr>
+          <p:nvPr/>
+        </p:nvPicPr>
+        <p:blipFill>
+          <a:blip r:embed="rId3">
+            <a:extLst>
+              <a:ext uri="{28A0092B-C50C-407E-A947-70E740481C1C}">
+                <a14:useLocalDpi xmlns:a14="http://schemas.microsoft.com/office/drawing/2010/main" val="0"/>
+              </a:ext>
+            </a:extLst>
+          </a:blip>
+          <a:srcRect/>
+          <a:stretch>
+            <a:fillRect/>
+          </a:stretch>
+        </p:blipFill>
+        <p:spPr bwMode="auto">
+          <a:xfrm>
+            <a:off x="3347864" y="1988840"/>
+            <a:ext cx="2384363" cy="4557886"/>
+          </a:xfrm>
+          <a:prstGeom prst="rect">
+            <a:avLst/>
+          </a:prstGeom>
+          <a:noFill/>
+          <a:extLst>
+            <a:ext uri="{909E8E84-426E-40DD-AFC4-6F175D3DCCD1}">
+              <a14:hiddenFill xmlns:a14="http://schemas.microsoft.com/office/drawing/2010/main">
+                <a:solidFill>
+                  <a:srgbClr val="FFFFFF"/>
+                </a:solidFill>
+              </a14:hiddenFill>
+            </a:ext>
+          </a:extLst>
+        </p:spPr>
+      </p:pic>
+      <p:pic>
+        <p:nvPicPr>
+          <p:cNvPr id="6" name="Picture 5" descr="D:\School\Design SE 4450\pics\screenshot3.png"/>
+          <p:cNvPicPr>
+            <a:picLocks noChangeAspect="1" noChangeArrowheads="1"/>
+          </p:cNvPicPr>
+          <p:nvPr/>
+        </p:nvPicPr>
+        <p:blipFill>
+          <a:blip r:embed="rId4">
+            <a:extLst>
+              <a:ext uri="{28A0092B-C50C-407E-A947-70E740481C1C}">
+                <a14:useLocalDpi xmlns:a14="http://schemas.microsoft.com/office/drawing/2010/main" val="0"/>
+              </a:ext>
+            </a:extLst>
+          </a:blip>
+          <a:srcRect/>
+          <a:stretch>
+            <a:fillRect/>
+          </a:stretch>
+        </p:blipFill>
+        <p:spPr bwMode="auto">
+          <a:xfrm>
+            <a:off x="6271858" y="1988841"/>
+            <a:ext cx="2404597" cy="4557886"/>
+          </a:xfrm>
+          <a:prstGeom prst="rect">
+            <a:avLst/>
+          </a:prstGeom>
+          <a:noFill/>
+          <a:extLst>
+            <a:ext uri="{909E8E84-426E-40DD-AFC4-6F175D3DCCD1}">
+              <a14:hiddenFill xmlns:a14="http://schemas.microsoft.com/office/drawing/2010/main">
+                <a:solidFill>
+                  <a:srgbClr val="FFFFFF"/>
+                </a:solidFill>
+              </a14:hiddenFill>
+            </a:ext>
+          </a:extLst>
+        </p:spPr>
+      </p:pic>
     </p:spTree>
     <p:extLst>
       <p:ext uri="{BB962C8B-B14F-4D97-AF65-F5344CB8AC3E}">

</xml_diff>

<commit_message>
Updates after meeting with prof.essex
</commit_message>
<xml_diff>
--- a/SAAPI_Walkthrough.pptx
+++ b/SAAPI_Walkthrough.pptx
@@ -119,7 +119,7 @@
   </p:defaultTextStyle>
   <p:extLst>
     <p:ext uri="{EFAFB233-063F-42B5-8137-9DF3F51BA10A}">
-      <p15:sldGuideLst xmlns:p15="http://schemas.microsoft.com/office/powerpoint/2012/main" xmlns="">
+      <p15:sldGuideLst xmlns:p15="http://schemas.microsoft.com/office/powerpoint/2012/main">
         <p15:guide id="1" orient="horz" pos="2160">
           <p15:clr>
             <a:srgbClr val="A4A3A4"/>
@@ -323,7 +323,7 @@
           <a:p>
             <a:fld id="{6EA3E9C6-D988-452F-9C00-5DEE413B1A0F}" type="datetimeFigureOut">
               <a:rPr lang="en-CA" smtClean="0"/>
-              <a:t>03/11/2014</a:t>
+              <a:t>04/11/2014</a:t>
             </a:fld>
             <a:endParaRPr lang="en-CA"/>
           </a:p>
@@ -488,7 +488,7 @@
           <a:p>
             <a:fld id="{6EA3E9C6-D988-452F-9C00-5DEE413B1A0F}" type="datetimeFigureOut">
               <a:rPr lang="en-CA" smtClean="0"/>
-              <a:t>03/11/2014</a:t>
+              <a:t>04/11/2014</a:t>
             </a:fld>
             <a:endParaRPr lang="en-CA"/>
           </a:p>
@@ -663,7 +663,7 @@
           <a:p>
             <a:fld id="{6EA3E9C6-D988-452F-9C00-5DEE413B1A0F}" type="datetimeFigureOut">
               <a:rPr lang="en-CA" smtClean="0"/>
-              <a:t>03/11/2014</a:t>
+              <a:t>04/11/2014</a:t>
             </a:fld>
             <a:endParaRPr lang="en-CA"/>
           </a:p>
@@ -828,7 +828,7 @@
           <a:p>
             <a:fld id="{6EA3E9C6-D988-452F-9C00-5DEE413B1A0F}" type="datetimeFigureOut">
               <a:rPr lang="en-CA" smtClean="0"/>
-              <a:t>03/11/2014</a:t>
+              <a:t>04/11/2014</a:t>
             </a:fld>
             <a:endParaRPr lang="en-CA"/>
           </a:p>
@@ -1067,7 +1067,7 @@
           <a:p>
             <a:fld id="{6EA3E9C6-D988-452F-9C00-5DEE413B1A0F}" type="datetimeFigureOut">
               <a:rPr lang="en-CA" smtClean="0"/>
-              <a:t>03/11/2014</a:t>
+              <a:t>04/11/2014</a:t>
             </a:fld>
             <a:endParaRPr lang="en-CA"/>
           </a:p>
@@ -1157,7 +1157,7 @@
           <a:p>
             <a:fld id="{6EA3E9C6-D988-452F-9C00-5DEE413B1A0F}" type="datetimeFigureOut">
               <a:rPr lang="en-CA" smtClean="0"/>
-              <a:t>03/11/2014</a:t>
+              <a:t>04/11/2014</a:t>
             </a:fld>
             <a:endParaRPr lang="en-CA"/>
           </a:p>
@@ -1531,7 +1531,7 @@
           <a:p>
             <a:fld id="{6EA3E9C6-D988-452F-9C00-5DEE413B1A0F}" type="datetimeFigureOut">
               <a:rPr lang="en-CA" smtClean="0"/>
-              <a:t>03/11/2014</a:t>
+              <a:t>04/11/2014</a:t>
             </a:fld>
             <a:endParaRPr lang="en-CA"/>
           </a:p>
@@ -1786,7 +1786,7 @@
           <a:p>
             <a:fld id="{6EA3E9C6-D988-452F-9C00-5DEE413B1A0F}" type="datetimeFigureOut">
               <a:rPr lang="en-CA" smtClean="0"/>
-              <a:t>03/11/2014</a:t>
+              <a:t>04/11/2014</a:t>
             </a:fld>
             <a:endParaRPr lang="en-CA"/>
           </a:p>
@@ -1876,7 +1876,7 @@
           <a:p>
             <a:fld id="{6EA3E9C6-D988-452F-9C00-5DEE413B1A0F}" type="datetimeFigureOut">
               <a:rPr lang="en-CA" smtClean="0"/>
-              <a:t>03/11/2014</a:t>
+              <a:t>04/11/2014</a:t>
             </a:fld>
             <a:endParaRPr lang="en-CA"/>
           </a:p>
@@ -2150,7 +2150,7 @@
           <a:p>
             <a:fld id="{6EA3E9C6-D988-452F-9C00-5DEE413B1A0F}" type="datetimeFigureOut">
               <a:rPr lang="en-CA" smtClean="0"/>
-              <a:t>03/11/2014</a:t>
+              <a:t>04/11/2014</a:t>
             </a:fld>
             <a:endParaRPr lang="en-CA"/>
           </a:p>
@@ -2422,7 +2422,7 @@
           <a:p>
             <a:fld id="{6EA3E9C6-D988-452F-9C00-5DEE413B1A0F}" type="datetimeFigureOut">
               <a:rPr lang="en-CA" smtClean="0"/>
-              <a:t>03/11/2014</a:t>
+              <a:t>04/11/2014</a:t>
             </a:fld>
             <a:endParaRPr lang="en-CA"/>
           </a:p>
@@ -2722,7 +2722,7 @@
           <a:p>
             <a:fld id="{6EA3E9C6-D988-452F-9C00-5DEE413B1A0F}" type="datetimeFigureOut">
               <a:rPr lang="en-CA" smtClean="0"/>
-              <a:t>03/11/2014</a:t>
+              <a:t>04/11/2014</a:t>
             </a:fld>
             <a:endParaRPr lang="en-CA"/>
           </a:p>
@@ -3495,7 +3495,15 @@
             </a:pPr>
             <a:r>
               <a:rPr lang="en-CA" dirty="0"/>
-              <a:t>All connections are made with HTTPS and SSL, and Parse will reject all non-HTTPS connections, preventing Man-in-the-Middle attacks</a:t>
+              <a:t>All connections are made with HTTPS and </a:t>
+            </a:r>
+            <a:r>
+              <a:rPr lang="en-CA" dirty="0" smtClean="0"/>
+              <a:t>TLS, </a:t>
+            </a:r>
+            <a:r>
+              <a:rPr lang="en-CA" dirty="0"/>
+              <a:t>and Parse will reject all non-HTTPS connections, preventing Man-in-the-Middle attacks</a:t>
             </a:r>
           </a:p>
           <a:p>
@@ -3624,7 +3632,15 @@
             </a:pPr>
             <a:r>
               <a:rPr lang="en-CA" dirty="0" smtClean="0"/>
-              <a:t>Currently used by Cisco, Cadillac, food Network, etc.</a:t>
+              <a:t>Currently used by Cisco, Cadillac, </a:t>
+            </a:r>
+            <a:r>
+              <a:rPr lang="en-CA" dirty="0" smtClean="0"/>
+              <a:t>Food </a:t>
+            </a:r>
+            <a:r>
+              <a:rPr lang="en-CA" dirty="0" smtClean="0"/>
+              <a:t>Network, etc.</a:t>
             </a:r>
           </a:p>
           <a:p>
@@ -4055,7 +4071,7 @@
         <p:spPr/>
         <p:txBody>
           <a:bodyPr>
-            <a:normAutofit lnSpcReduction="10000"/>
+            <a:normAutofit/>
           </a:bodyPr>
           <a:lstStyle/>
           <a:p>
@@ -4093,11 +4109,7 @@
           <a:p>
             <a:r>
               <a:rPr lang="en-CA" dirty="0" smtClean="0"/>
-              <a:t>Certain factors shown to affect concentration of drug in </a:t>
-            </a:r>
-            <a:r>
-              <a:rPr lang="en-CA" smtClean="0"/>
-              <a:t>blood stream</a:t>
+              <a:t>Uses patients genotype to determine recommended dosage</a:t>
             </a:r>
             <a:endParaRPr lang="en-CA" dirty="0"/>
           </a:p>
@@ -4423,29 +4435,29 @@
           <a:p>
             <a:r>
               <a:rPr lang="en-CA" dirty="0" smtClean="0"/>
-              <a:t>Mobile solution to allow patients to view their prescription information</a:t>
-            </a:r>
-          </a:p>
-          <a:p>
+              <a:t>Mobile solution to allow patients to view their </a:t>
+            </a:r>
+            <a:r>
+              <a:rPr lang="en-CA" dirty="0" smtClean="0"/>
+              <a:t>personal prescription information</a:t>
+            </a:r>
             <a:endParaRPr lang="en-CA" dirty="0" smtClean="0"/>
           </a:p>
           <a:p>
-            <a:r>
-              <a:rPr lang="en-CA" dirty="0" smtClean="0"/>
-              <a:t>Will allow doctors to concentrate time more on work than informing patients</a:t>
-            </a:r>
-          </a:p>
-          <a:p>
             <a:endParaRPr lang="en-CA" dirty="0" smtClean="0"/>
           </a:p>
           <a:p>
             <a:r>
               <a:rPr lang="en-CA" dirty="0" smtClean="0"/>
-              <a:t>Create mock database based on </a:t>
-            </a:r>
-            <a:r>
-              <a:rPr lang="en-CA" smtClean="0"/>
-              <a:t>hospitals structure</a:t>
+              <a:t>Will allow doctors to concentrate </a:t>
+            </a:r>
+            <a:r>
+              <a:rPr lang="en-CA" dirty="0" smtClean="0"/>
+              <a:t>more time </a:t>
+            </a:r>
+            <a:r>
+              <a:rPr lang="en-CA" dirty="0" smtClean="0"/>
+              <a:t>on research</a:t>
             </a:r>
           </a:p>
           <a:p>
@@ -4454,8 +4466,18 @@
           <a:p>
             <a:r>
               <a:rPr lang="en-CA" dirty="0" smtClean="0"/>
-              <a:t>Requires high level of security to ensure secrecy for patients</a:t>
-            </a:r>
+              <a:t>Create mock database based on hospitals structure</a:t>
+            </a:r>
+          </a:p>
+          <a:p>
+            <a:endParaRPr lang="en-CA" dirty="0" smtClean="0"/>
+          </a:p>
+          <a:p>
+            <a:r>
+              <a:rPr lang="en-CA" dirty="0" smtClean="0"/>
+              <a:t>Must hide some information from patients and prevent attacks</a:t>
+            </a:r>
+            <a:endParaRPr lang="en-CA" dirty="0" smtClean="0"/>
           </a:p>
         </p:txBody>
       </p:sp>
@@ -4548,6 +4570,16 @@
               <a:rPr lang="en-CA" dirty="0" smtClean="0"/>
               <a:t>system</a:t>
             </a:r>
+          </a:p>
+          <a:p>
+            <a:endParaRPr lang="en-CA" dirty="0"/>
+          </a:p>
+          <a:p>
+            <a:r>
+              <a:rPr lang="en-CA" dirty="0" smtClean="0"/>
+              <a:t>Personalized medication app</a:t>
+            </a:r>
+            <a:endParaRPr lang="en-CA" dirty="0" smtClean="0"/>
           </a:p>
           <a:p>
             <a:endParaRPr lang="en-CA" dirty="0"/>
@@ -4929,20 +4961,34 @@
           <a:p>
             <a:r>
               <a:rPr lang="en-CA" dirty="0" smtClean="0"/>
-              <a:t>Notify user of missing internet connection</a:t>
-            </a:r>
-          </a:p>
-          <a:p>
-            <a:r>
-              <a:rPr lang="en-CA" dirty="0" smtClean="0"/>
-              <a:t>Display messages from doctor</a:t>
-            </a:r>
-          </a:p>
-          <a:p>
-            <a:r>
-              <a:rPr lang="en-CA" dirty="0" smtClean="0"/>
-              <a:t>Send push notification when doctor sends a message</a:t>
-            </a:r>
+              <a:t>Notify user of </a:t>
+            </a:r>
+            <a:r>
+              <a:rPr lang="en-CA" dirty="0" smtClean="0"/>
+              <a:t>invalid internet connection</a:t>
+            </a:r>
+          </a:p>
+          <a:p>
+            <a:r>
+              <a:rPr lang="en-CA" dirty="0" smtClean="0"/>
+              <a:t>Provide one way communication to patient</a:t>
+            </a:r>
+            <a:endParaRPr lang="en-CA" dirty="0" smtClean="0"/>
+          </a:p>
+          <a:p>
+            <a:r>
+              <a:rPr lang="en-CA" dirty="0" smtClean="0"/>
+              <a:t>Send </a:t>
+            </a:r>
+            <a:r>
+              <a:rPr lang="en-CA" dirty="0" smtClean="0"/>
+              <a:t>push notification when doctor sends a </a:t>
+            </a:r>
+            <a:r>
+              <a:rPr lang="en-CA" dirty="0" smtClean="0"/>
+              <a:t>message</a:t>
+            </a:r>
+            <a:endParaRPr lang="en-CA" dirty="0" smtClean="0"/>
           </a:p>
           <a:p>
             <a:r>

</xml_diff>

<commit_message>
Updated slides annnnnnnd workspace
</commit_message>
<xml_diff>
--- a/SAAPI_Walkthrough.pptx
+++ b/SAAPI_Walkthrough.pptx
@@ -4,6 +4,9 @@
   <p:sldMasterIdLst>
     <p:sldMasterId id="2147483780" r:id="rId1"/>
   </p:sldMasterIdLst>
+  <p:notesMasterIdLst>
+    <p:notesMasterId r:id="rId18"/>
+  </p:notesMasterIdLst>
   <p:sldIdLst>
     <p:sldId id="256" r:id="rId2"/>
     <p:sldId id="257" r:id="rId3"/>
@@ -138,6 +141,1676 @@
 </p:presentation>
 </file>
 
+<file path=ppt/notesMasters/notesMaster1.xml><?xml version="1.0" encoding="utf-8"?>
+<p:notesMaster xmlns:a="http://schemas.openxmlformats.org/drawingml/2006/main" xmlns:r="http://schemas.openxmlformats.org/officeDocument/2006/relationships" xmlns:p="http://schemas.openxmlformats.org/presentationml/2006/main">
+  <p:cSld>
+    <p:bg>
+      <p:bgRef idx="1001">
+        <a:schemeClr val="bg1"/>
+      </p:bgRef>
+    </p:bg>
+    <p:spTree>
+      <p:nvGrpSpPr>
+        <p:cNvPr id="1" name=""/>
+        <p:cNvGrpSpPr/>
+        <p:nvPr/>
+      </p:nvGrpSpPr>
+      <p:grpSpPr>
+        <a:xfrm>
+          <a:off x="0" y="0"/>
+          <a:ext cx="0" cy="0"/>
+          <a:chOff x="0" y="0"/>
+          <a:chExt cx="0" cy="0"/>
+        </a:xfrm>
+      </p:grpSpPr>
+      <p:sp>
+        <p:nvSpPr>
+          <p:cNvPr id="2" name="Header Placeholder 1"/>
+          <p:cNvSpPr>
+            <a:spLocks noGrp="1"/>
+          </p:cNvSpPr>
+          <p:nvPr>
+            <p:ph type="hdr" sz="quarter"/>
+          </p:nvPr>
+        </p:nvSpPr>
+        <p:spPr>
+          <a:xfrm>
+            <a:off x="0" y="0"/>
+            <a:ext cx="2971800" cy="458788"/>
+          </a:xfrm>
+          <a:prstGeom prst="rect">
+            <a:avLst/>
+          </a:prstGeom>
+        </p:spPr>
+        <p:txBody>
+          <a:bodyPr vert="horz" lIns="91440" tIns="45720" rIns="91440" bIns="45720" rtlCol="0"/>
+          <a:lstStyle>
+            <a:lvl1pPr algn="l">
+              <a:defRPr sz="1200"/>
+            </a:lvl1pPr>
+          </a:lstStyle>
+          <a:p>
+            <a:endParaRPr lang="en-CA"/>
+          </a:p>
+        </p:txBody>
+      </p:sp>
+      <p:sp>
+        <p:nvSpPr>
+          <p:cNvPr id="3" name="Date Placeholder 2"/>
+          <p:cNvSpPr>
+            <a:spLocks noGrp="1"/>
+          </p:cNvSpPr>
+          <p:nvPr>
+            <p:ph type="dt" idx="1"/>
+          </p:nvPr>
+        </p:nvSpPr>
+        <p:spPr>
+          <a:xfrm>
+            <a:off x="3884613" y="0"/>
+            <a:ext cx="2971800" cy="458788"/>
+          </a:xfrm>
+          <a:prstGeom prst="rect">
+            <a:avLst/>
+          </a:prstGeom>
+        </p:spPr>
+        <p:txBody>
+          <a:bodyPr vert="horz" lIns="91440" tIns="45720" rIns="91440" bIns="45720" rtlCol="0"/>
+          <a:lstStyle>
+            <a:lvl1pPr algn="r">
+              <a:defRPr sz="1200"/>
+            </a:lvl1pPr>
+          </a:lstStyle>
+          <a:p>
+            <a:fld id="{DCEE385F-1006-4828-B7C2-BD2792200E48}" type="datetimeFigureOut">
+              <a:rPr lang="en-CA" smtClean="0"/>
+              <a:t>2015-03-27</a:t>
+            </a:fld>
+            <a:endParaRPr lang="en-CA"/>
+          </a:p>
+        </p:txBody>
+      </p:sp>
+      <p:sp>
+        <p:nvSpPr>
+          <p:cNvPr id="4" name="Slide Image Placeholder 3"/>
+          <p:cNvSpPr>
+            <a:spLocks noGrp="1" noRot="1" noChangeAspect="1"/>
+          </p:cNvSpPr>
+          <p:nvPr>
+            <p:ph type="sldImg" idx="2"/>
+          </p:nvPr>
+        </p:nvSpPr>
+        <p:spPr>
+          <a:xfrm>
+            <a:off x="1371600" y="1143000"/>
+            <a:ext cx="4114800" cy="3086100"/>
+          </a:xfrm>
+          <a:prstGeom prst="rect">
+            <a:avLst/>
+          </a:prstGeom>
+          <a:noFill/>
+          <a:ln w="12700">
+            <a:solidFill>
+              <a:prstClr val="black"/>
+            </a:solidFill>
+          </a:ln>
+        </p:spPr>
+        <p:txBody>
+          <a:bodyPr vert="horz" lIns="91440" tIns="45720" rIns="91440" bIns="45720" rtlCol="0" anchor="ctr"/>
+          <a:lstStyle/>
+          <a:p>
+            <a:endParaRPr lang="en-CA"/>
+          </a:p>
+        </p:txBody>
+      </p:sp>
+      <p:sp>
+        <p:nvSpPr>
+          <p:cNvPr id="5" name="Notes Placeholder 4"/>
+          <p:cNvSpPr>
+            <a:spLocks noGrp="1"/>
+          </p:cNvSpPr>
+          <p:nvPr>
+            <p:ph type="body" sz="quarter" idx="3"/>
+          </p:nvPr>
+        </p:nvSpPr>
+        <p:spPr>
+          <a:xfrm>
+            <a:off x="685800" y="4400550"/>
+            <a:ext cx="5486400" cy="3600450"/>
+          </a:xfrm>
+          <a:prstGeom prst="rect">
+            <a:avLst/>
+          </a:prstGeom>
+        </p:spPr>
+        <p:txBody>
+          <a:bodyPr vert="horz" lIns="91440" tIns="45720" rIns="91440" bIns="45720" rtlCol="0"/>
+          <a:lstStyle/>
+          <a:p>
+            <a:pPr lvl="0"/>
+            <a:r>
+              <a:rPr lang="en-US" smtClean="0"/>
+              <a:t>Click to edit Master text styles</a:t>
+            </a:r>
+          </a:p>
+          <a:p>
+            <a:pPr lvl="1"/>
+            <a:r>
+              <a:rPr lang="en-US" smtClean="0"/>
+              <a:t>Second level</a:t>
+            </a:r>
+          </a:p>
+          <a:p>
+            <a:pPr lvl="2"/>
+            <a:r>
+              <a:rPr lang="en-US" smtClean="0"/>
+              <a:t>Third level</a:t>
+            </a:r>
+          </a:p>
+          <a:p>
+            <a:pPr lvl="3"/>
+            <a:r>
+              <a:rPr lang="en-US" smtClean="0"/>
+              <a:t>Fourth level</a:t>
+            </a:r>
+          </a:p>
+          <a:p>
+            <a:pPr lvl="4"/>
+            <a:r>
+              <a:rPr lang="en-US" smtClean="0"/>
+              <a:t>Fifth level</a:t>
+            </a:r>
+            <a:endParaRPr lang="en-CA"/>
+          </a:p>
+        </p:txBody>
+      </p:sp>
+      <p:sp>
+        <p:nvSpPr>
+          <p:cNvPr id="6" name="Footer Placeholder 5"/>
+          <p:cNvSpPr>
+            <a:spLocks noGrp="1"/>
+          </p:cNvSpPr>
+          <p:nvPr>
+            <p:ph type="ftr" sz="quarter" idx="4"/>
+          </p:nvPr>
+        </p:nvSpPr>
+        <p:spPr>
+          <a:xfrm>
+            <a:off x="0" y="8685213"/>
+            <a:ext cx="2971800" cy="458787"/>
+          </a:xfrm>
+          <a:prstGeom prst="rect">
+            <a:avLst/>
+          </a:prstGeom>
+        </p:spPr>
+        <p:txBody>
+          <a:bodyPr vert="horz" lIns="91440" tIns="45720" rIns="91440" bIns="45720" rtlCol="0" anchor="b"/>
+          <a:lstStyle>
+            <a:lvl1pPr algn="l">
+              <a:defRPr sz="1200"/>
+            </a:lvl1pPr>
+          </a:lstStyle>
+          <a:p>
+            <a:endParaRPr lang="en-CA"/>
+          </a:p>
+        </p:txBody>
+      </p:sp>
+      <p:sp>
+        <p:nvSpPr>
+          <p:cNvPr id="7" name="Slide Number Placeholder 6"/>
+          <p:cNvSpPr>
+            <a:spLocks noGrp="1"/>
+          </p:cNvSpPr>
+          <p:nvPr>
+            <p:ph type="sldNum" sz="quarter" idx="5"/>
+          </p:nvPr>
+        </p:nvSpPr>
+        <p:spPr>
+          <a:xfrm>
+            <a:off x="3884613" y="8685213"/>
+            <a:ext cx="2971800" cy="458787"/>
+          </a:xfrm>
+          <a:prstGeom prst="rect">
+            <a:avLst/>
+          </a:prstGeom>
+        </p:spPr>
+        <p:txBody>
+          <a:bodyPr vert="horz" lIns="91440" tIns="45720" rIns="91440" bIns="45720" rtlCol="0" anchor="b"/>
+          <a:lstStyle>
+            <a:lvl1pPr algn="r">
+              <a:defRPr sz="1200"/>
+            </a:lvl1pPr>
+          </a:lstStyle>
+          <a:p>
+            <a:fld id="{DEA1FBCD-0745-4DDC-9504-6C151D3D2751}" type="slidenum">
+              <a:rPr lang="en-CA" smtClean="0"/>
+              <a:t>‹#›</a:t>
+            </a:fld>
+            <a:endParaRPr lang="en-CA"/>
+          </a:p>
+        </p:txBody>
+      </p:sp>
+    </p:spTree>
+    <p:extLst>
+      <p:ext uri="{BB962C8B-B14F-4D97-AF65-F5344CB8AC3E}">
+        <p14:creationId xmlns:p14="http://schemas.microsoft.com/office/powerpoint/2010/main" val="3078294652"/>
+      </p:ext>
+    </p:extLst>
+  </p:cSld>
+  <p:clrMap bg1="lt1" tx1="dk1" bg2="lt2" tx2="dk2" accent1="accent1" accent2="accent2" accent3="accent3" accent4="accent4" accent5="accent5" accent6="accent6" hlink="hlink" folHlink="folHlink"/>
+  <p:notesStyle>
+    <a:lvl1pPr marL="0" algn="l" defTabSz="914400" rtl="0" eaLnBrk="1" latinLnBrk="0" hangingPunct="1">
+      <a:defRPr sz="1200" kern="1200">
+        <a:solidFill>
+          <a:schemeClr val="tx1"/>
+        </a:solidFill>
+        <a:latin typeface="+mn-lt"/>
+        <a:ea typeface="+mn-ea"/>
+        <a:cs typeface="+mn-cs"/>
+      </a:defRPr>
+    </a:lvl1pPr>
+    <a:lvl2pPr marL="457200" algn="l" defTabSz="914400" rtl="0" eaLnBrk="1" latinLnBrk="0" hangingPunct="1">
+      <a:defRPr sz="1200" kern="1200">
+        <a:solidFill>
+          <a:schemeClr val="tx1"/>
+        </a:solidFill>
+        <a:latin typeface="+mn-lt"/>
+        <a:ea typeface="+mn-ea"/>
+        <a:cs typeface="+mn-cs"/>
+      </a:defRPr>
+    </a:lvl2pPr>
+    <a:lvl3pPr marL="914400" algn="l" defTabSz="914400" rtl="0" eaLnBrk="1" latinLnBrk="0" hangingPunct="1">
+      <a:defRPr sz="1200" kern="1200">
+        <a:solidFill>
+          <a:schemeClr val="tx1"/>
+        </a:solidFill>
+        <a:latin typeface="+mn-lt"/>
+        <a:ea typeface="+mn-ea"/>
+        <a:cs typeface="+mn-cs"/>
+      </a:defRPr>
+    </a:lvl3pPr>
+    <a:lvl4pPr marL="1371600" algn="l" defTabSz="914400" rtl="0" eaLnBrk="1" latinLnBrk="0" hangingPunct="1">
+      <a:defRPr sz="1200" kern="1200">
+        <a:solidFill>
+          <a:schemeClr val="tx1"/>
+        </a:solidFill>
+        <a:latin typeface="+mn-lt"/>
+        <a:ea typeface="+mn-ea"/>
+        <a:cs typeface="+mn-cs"/>
+      </a:defRPr>
+    </a:lvl4pPr>
+    <a:lvl5pPr marL="1828800" algn="l" defTabSz="914400" rtl="0" eaLnBrk="1" latinLnBrk="0" hangingPunct="1">
+      <a:defRPr sz="1200" kern="1200">
+        <a:solidFill>
+          <a:schemeClr val="tx1"/>
+        </a:solidFill>
+        <a:latin typeface="+mn-lt"/>
+        <a:ea typeface="+mn-ea"/>
+        <a:cs typeface="+mn-cs"/>
+      </a:defRPr>
+    </a:lvl5pPr>
+    <a:lvl6pPr marL="2286000" algn="l" defTabSz="914400" rtl="0" eaLnBrk="1" latinLnBrk="0" hangingPunct="1">
+      <a:defRPr sz="1200" kern="1200">
+        <a:solidFill>
+          <a:schemeClr val="tx1"/>
+        </a:solidFill>
+        <a:latin typeface="+mn-lt"/>
+        <a:ea typeface="+mn-ea"/>
+        <a:cs typeface="+mn-cs"/>
+      </a:defRPr>
+    </a:lvl6pPr>
+    <a:lvl7pPr marL="2743200" algn="l" defTabSz="914400" rtl="0" eaLnBrk="1" latinLnBrk="0" hangingPunct="1">
+      <a:defRPr sz="1200" kern="1200">
+        <a:solidFill>
+          <a:schemeClr val="tx1"/>
+        </a:solidFill>
+        <a:latin typeface="+mn-lt"/>
+        <a:ea typeface="+mn-ea"/>
+        <a:cs typeface="+mn-cs"/>
+      </a:defRPr>
+    </a:lvl7pPr>
+    <a:lvl8pPr marL="3200400" algn="l" defTabSz="914400" rtl="0" eaLnBrk="1" latinLnBrk="0" hangingPunct="1">
+      <a:defRPr sz="1200" kern="1200">
+        <a:solidFill>
+          <a:schemeClr val="tx1"/>
+        </a:solidFill>
+        <a:latin typeface="+mn-lt"/>
+        <a:ea typeface="+mn-ea"/>
+        <a:cs typeface="+mn-cs"/>
+      </a:defRPr>
+    </a:lvl8pPr>
+    <a:lvl9pPr marL="3657600" algn="l" defTabSz="914400" rtl="0" eaLnBrk="1" latinLnBrk="0" hangingPunct="1">
+      <a:defRPr sz="1200" kern="1200">
+        <a:solidFill>
+          <a:schemeClr val="tx1"/>
+        </a:solidFill>
+        <a:latin typeface="+mn-lt"/>
+        <a:ea typeface="+mn-ea"/>
+        <a:cs typeface="+mn-cs"/>
+      </a:defRPr>
+    </a:lvl9pPr>
+  </p:notesStyle>
+</p:notesMaster>
+</file>
+
+<file path=ppt/notesSlides/notesSlide1.xml><?xml version="1.0" encoding="utf-8"?>
+<p:notes xmlns:a="http://schemas.openxmlformats.org/drawingml/2006/main" xmlns:r="http://schemas.openxmlformats.org/officeDocument/2006/relationships" xmlns:p="http://schemas.openxmlformats.org/presentationml/2006/main">
+  <p:cSld>
+    <p:spTree>
+      <p:nvGrpSpPr>
+        <p:cNvPr id="1" name=""/>
+        <p:cNvGrpSpPr/>
+        <p:nvPr/>
+      </p:nvGrpSpPr>
+      <p:grpSpPr>
+        <a:xfrm>
+          <a:off x="0" y="0"/>
+          <a:ext cx="0" cy="0"/>
+          <a:chOff x="0" y="0"/>
+          <a:chExt cx="0" cy="0"/>
+        </a:xfrm>
+      </p:grpSpPr>
+      <p:sp>
+        <p:nvSpPr>
+          <p:cNvPr id="2" name="Slide Image Placeholder 1"/>
+          <p:cNvSpPr>
+            <a:spLocks noGrp="1" noRot="1" noChangeAspect="1"/>
+          </p:cNvSpPr>
+          <p:nvPr>
+            <p:ph type="sldImg"/>
+          </p:nvPr>
+        </p:nvSpPr>
+        <p:spPr/>
+      </p:sp>
+      <p:sp>
+        <p:nvSpPr>
+          <p:cNvPr id="3" name="Notes Placeholder 2"/>
+          <p:cNvSpPr>
+            <a:spLocks noGrp="1"/>
+          </p:cNvSpPr>
+          <p:nvPr>
+            <p:ph type="body" idx="1"/>
+          </p:nvPr>
+        </p:nvSpPr>
+        <p:spPr/>
+        <p:txBody>
+          <a:bodyPr/>
+          <a:lstStyle/>
+          <a:p>
+            <a:r>
+              <a:rPr lang="en-CA" dirty="0" smtClean="0"/>
+              <a:t>Anton</a:t>
+            </a:r>
+            <a:endParaRPr lang="en-CA" dirty="0"/>
+          </a:p>
+        </p:txBody>
+      </p:sp>
+      <p:sp>
+        <p:nvSpPr>
+          <p:cNvPr id="4" name="Slide Number Placeholder 3"/>
+          <p:cNvSpPr>
+            <a:spLocks noGrp="1"/>
+          </p:cNvSpPr>
+          <p:nvPr>
+            <p:ph type="sldNum" sz="quarter" idx="10"/>
+          </p:nvPr>
+        </p:nvSpPr>
+        <p:spPr/>
+        <p:txBody>
+          <a:bodyPr/>
+          <a:lstStyle/>
+          <a:p>
+            <a:fld id="{DEA1FBCD-0745-4DDC-9504-6C151D3D2751}" type="slidenum">
+              <a:rPr lang="en-CA" smtClean="0"/>
+              <a:t>1</a:t>
+            </a:fld>
+            <a:endParaRPr lang="en-CA"/>
+          </a:p>
+        </p:txBody>
+      </p:sp>
+    </p:spTree>
+    <p:extLst>
+      <p:ext uri="{BB962C8B-B14F-4D97-AF65-F5344CB8AC3E}">
+        <p14:creationId xmlns:p14="http://schemas.microsoft.com/office/powerpoint/2010/main" val="3340720051"/>
+      </p:ext>
+    </p:extLst>
+  </p:cSld>
+  <p:clrMapOvr>
+    <a:masterClrMapping/>
+  </p:clrMapOvr>
+</p:notes>
+</file>
+
+<file path=ppt/notesSlides/notesSlide10.xml><?xml version="1.0" encoding="utf-8"?>
+<p:notes xmlns:a="http://schemas.openxmlformats.org/drawingml/2006/main" xmlns:r="http://schemas.openxmlformats.org/officeDocument/2006/relationships" xmlns:p="http://schemas.openxmlformats.org/presentationml/2006/main">
+  <p:cSld>
+    <p:spTree>
+      <p:nvGrpSpPr>
+        <p:cNvPr id="1" name=""/>
+        <p:cNvGrpSpPr/>
+        <p:nvPr/>
+      </p:nvGrpSpPr>
+      <p:grpSpPr>
+        <a:xfrm>
+          <a:off x="0" y="0"/>
+          <a:ext cx="0" cy="0"/>
+          <a:chOff x="0" y="0"/>
+          <a:chExt cx="0" cy="0"/>
+        </a:xfrm>
+      </p:grpSpPr>
+      <p:sp>
+        <p:nvSpPr>
+          <p:cNvPr id="2" name="Slide Image Placeholder 1"/>
+          <p:cNvSpPr>
+            <a:spLocks noGrp="1" noRot="1" noChangeAspect="1"/>
+          </p:cNvSpPr>
+          <p:nvPr>
+            <p:ph type="sldImg"/>
+          </p:nvPr>
+        </p:nvSpPr>
+        <p:spPr/>
+      </p:sp>
+      <p:sp>
+        <p:nvSpPr>
+          <p:cNvPr id="3" name="Notes Placeholder 2"/>
+          <p:cNvSpPr>
+            <a:spLocks noGrp="1"/>
+          </p:cNvSpPr>
+          <p:nvPr>
+            <p:ph type="body" idx="1"/>
+          </p:nvPr>
+        </p:nvSpPr>
+        <p:spPr/>
+        <p:txBody>
+          <a:bodyPr/>
+          <a:lstStyle/>
+          <a:p>
+            <a:r>
+              <a:rPr lang="en-CA" dirty="0" smtClean="0"/>
+              <a:t>Anton</a:t>
+            </a:r>
+            <a:endParaRPr lang="en-CA" dirty="0"/>
+          </a:p>
+        </p:txBody>
+      </p:sp>
+      <p:sp>
+        <p:nvSpPr>
+          <p:cNvPr id="4" name="Slide Number Placeholder 3"/>
+          <p:cNvSpPr>
+            <a:spLocks noGrp="1"/>
+          </p:cNvSpPr>
+          <p:nvPr>
+            <p:ph type="sldNum" sz="quarter" idx="10"/>
+          </p:nvPr>
+        </p:nvSpPr>
+        <p:spPr/>
+        <p:txBody>
+          <a:bodyPr/>
+          <a:lstStyle/>
+          <a:p>
+            <a:fld id="{DEA1FBCD-0745-4DDC-9504-6C151D3D2751}" type="slidenum">
+              <a:rPr lang="en-CA" smtClean="0"/>
+              <a:t>10</a:t>
+            </a:fld>
+            <a:endParaRPr lang="en-CA"/>
+          </a:p>
+        </p:txBody>
+      </p:sp>
+    </p:spTree>
+    <p:extLst>
+      <p:ext uri="{BB962C8B-B14F-4D97-AF65-F5344CB8AC3E}">
+        <p14:creationId xmlns:p14="http://schemas.microsoft.com/office/powerpoint/2010/main" val="4282807022"/>
+      </p:ext>
+    </p:extLst>
+  </p:cSld>
+  <p:clrMapOvr>
+    <a:masterClrMapping/>
+  </p:clrMapOvr>
+</p:notes>
+</file>
+
+<file path=ppt/notesSlides/notesSlide11.xml><?xml version="1.0" encoding="utf-8"?>
+<p:notes xmlns:a="http://schemas.openxmlformats.org/drawingml/2006/main" xmlns:r="http://schemas.openxmlformats.org/officeDocument/2006/relationships" xmlns:p="http://schemas.openxmlformats.org/presentationml/2006/main">
+  <p:cSld>
+    <p:spTree>
+      <p:nvGrpSpPr>
+        <p:cNvPr id="1" name=""/>
+        <p:cNvGrpSpPr/>
+        <p:nvPr/>
+      </p:nvGrpSpPr>
+      <p:grpSpPr>
+        <a:xfrm>
+          <a:off x="0" y="0"/>
+          <a:ext cx="0" cy="0"/>
+          <a:chOff x="0" y="0"/>
+          <a:chExt cx="0" cy="0"/>
+        </a:xfrm>
+      </p:grpSpPr>
+      <p:sp>
+        <p:nvSpPr>
+          <p:cNvPr id="2" name="Slide Image Placeholder 1"/>
+          <p:cNvSpPr>
+            <a:spLocks noGrp="1" noRot="1" noChangeAspect="1"/>
+          </p:cNvSpPr>
+          <p:nvPr>
+            <p:ph type="sldImg"/>
+          </p:nvPr>
+        </p:nvSpPr>
+        <p:spPr/>
+      </p:sp>
+      <p:sp>
+        <p:nvSpPr>
+          <p:cNvPr id="3" name="Notes Placeholder 2"/>
+          <p:cNvSpPr>
+            <a:spLocks noGrp="1"/>
+          </p:cNvSpPr>
+          <p:nvPr>
+            <p:ph type="body" idx="1"/>
+          </p:nvPr>
+        </p:nvSpPr>
+        <p:spPr/>
+        <p:txBody>
+          <a:bodyPr/>
+          <a:lstStyle/>
+          <a:p>
+            <a:r>
+              <a:rPr lang="en-CA" dirty="0" smtClean="0"/>
+              <a:t>Shawn</a:t>
+            </a:r>
+            <a:endParaRPr lang="en-CA" dirty="0"/>
+          </a:p>
+        </p:txBody>
+      </p:sp>
+      <p:sp>
+        <p:nvSpPr>
+          <p:cNvPr id="4" name="Slide Number Placeholder 3"/>
+          <p:cNvSpPr>
+            <a:spLocks noGrp="1"/>
+          </p:cNvSpPr>
+          <p:nvPr>
+            <p:ph type="sldNum" sz="quarter" idx="10"/>
+          </p:nvPr>
+        </p:nvSpPr>
+        <p:spPr/>
+        <p:txBody>
+          <a:bodyPr/>
+          <a:lstStyle/>
+          <a:p>
+            <a:fld id="{DEA1FBCD-0745-4DDC-9504-6C151D3D2751}" type="slidenum">
+              <a:rPr lang="en-CA" smtClean="0"/>
+              <a:t>11</a:t>
+            </a:fld>
+            <a:endParaRPr lang="en-CA"/>
+          </a:p>
+        </p:txBody>
+      </p:sp>
+    </p:spTree>
+    <p:extLst>
+      <p:ext uri="{BB962C8B-B14F-4D97-AF65-F5344CB8AC3E}">
+        <p14:creationId xmlns:p14="http://schemas.microsoft.com/office/powerpoint/2010/main" val="1221801269"/>
+      </p:ext>
+    </p:extLst>
+  </p:cSld>
+  <p:clrMapOvr>
+    <a:masterClrMapping/>
+  </p:clrMapOvr>
+</p:notes>
+</file>
+
+<file path=ppt/notesSlides/notesSlide12.xml><?xml version="1.0" encoding="utf-8"?>
+<p:notes xmlns:a="http://schemas.openxmlformats.org/drawingml/2006/main" xmlns:r="http://schemas.openxmlformats.org/officeDocument/2006/relationships" xmlns:p="http://schemas.openxmlformats.org/presentationml/2006/main">
+  <p:cSld>
+    <p:spTree>
+      <p:nvGrpSpPr>
+        <p:cNvPr id="1" name=""/>
+        <p:cNvGrpSpPr/>
+        <p:nvPr/>
+      </p:nvGrpSpPr>
+      <p:grpSpPr>
+        <a:xfrm>
+          <a:off x="0" y="0"/>
+          <a:ext cx="0" cy="0"/>
+          <a:chOff x="0" y="0"/>
+          <a:chExt cx="0" cy="0"/>
+        </a:xfrm>
+      </p:grpSpPr>
+      <p:sp>
+        <p:nvSpPr>
+          <p:cNvPr id="2" name="Slide Image Placeholder 1"/>
+          <p:cNvSpPr>
+            <a:spLocks noGrp="1" noRot="1" noChangeAspect="1"/>
+          </p:cNvSpPr>
+          <p:nvPr>
+            <p:ph type="sldImg"/>
+          </p:nvPr>
+        </p:nvSpPr>
+        <p:spPr/>
+      </p:sp>
+      <p:sp>
+        <p:nvSpPr>
+          <p:cNvPr id="3" name="Notes Placeholder 2"/>
+          <p:cNvSpPr>
+            <a:spLocks noGrp="1"/>
+          </p:cNvSpPr>
+          <p:nvPr>
+            <p:ph type="body" idx="1"/>
+          </p:nvPr>
+        </p:nvSpPr>
+        <p:spPr/>
+        <p:txBody>
+          <a:bodyPr/>
+          <a:lstStyle/>
+          <a:p>
+            <a:r>
+              <a:rPr lang="en-CA" dirty="0" smtClean="0"/>
+              <a:t>Shawn</a:t>
+            </a:r>
+            <a:endParaRPr lang="en-CA" dirty="0"/>
+          </a:p>
+        </p:txBody>
+      </p:sp>
+      <p:sp>
+        <p:nvSpPr>
+          <p:cNvPr id="4" name="Slide Number Placeholder 3"/>
+          <p:cNvSpPr>
+            <a:spLocks noGrp="1"/>
+          </p:cNvSpPr>
+          <p:nvPr>
+            <p:ph type="sldNum" sz="quarter" idx="10"/>
+          </p:nvPr>
+        </p:nvSpPr>
+        <p:spPr/>
+        <p:txBody>
+          <a:bodyPr/>
+          <a:lstStyle/>
+          <a:p>
+            <a:fld id="{DEA1FBCD-0745-4DDC-9504-6C151D3D2751}" type="slidenum">
+              <a:rPr lang="en-CA" smtClean="0"/>
+              <a:t>12</a:t>
+            </a:fld>
+            <a:endParaRPr lang="en-CA"/>
+          </a:p>
+        </p:txBody>
+      </p:sp>
+    </p:spTree>
+    <p:extLst>
+      <p:ext uri="{BB962C8B-B14F-4D97-AF65-F5344CB8AC3E}">
+        <p14:creationId xmlns:p14="http://schemas.microsoft.com/office/powerpoint/2010/main" val="210963758"/>
+      </p:ext>
+    </p:extLst>
+  </p:cSld>
+  <p:clrMapOvr>
+    <a:masterClrMapping/>
+  </p:clrMapOvr>
+</p:notes>
+</file>
+
+<file path=ppt/notesSlides/notesSlide13.xml><?xml version="1.0" encoding="utf-8"?>
+<p:notes xmlns:a="http://schemas.openxmlformats.org/drawingml/2006/main" xmlns:r="http://schemas.openxmlformats.org/officeDocument/2006/relationships" xmlns:p="http://schemas.openxmlformats.org/presentationml/2006/main">
+  <p:cSld>
+    <p:spTree>
+      <p:nvGrpSpPr>
+        <p:cNvPr id="1" name=""/>
+        <p:cNvGrpSpPr/>
+        <p:nvPr/>
+      </p:nvGrpSpPr>
+      <p:grpSpPr>
+        <a:xfrm>
+          <a:off x="0" y="0"/>
+          <a:ext cx="0" cy="0"/>
+          <a:chOff x="0" y="0"/>
+          <a:chExt cx="0" cy="0"/>
+        </a:xfrm>
+      </p:grpSpPr>
+      <p:sp>
+        <p:nvSpPr>
+          <p:cNvPr id="2" name="Slide Image Placeholder 1"/>
+          <p:cNvSpPr>
+            <a:spLocks noGrp="1" noRot="1" noChangeAspect="1"/>
+          </p:cNvSpPr>
+          <p:nvPr>
+            <p:ph type="sldImg"/>
+          </p:nvPr>
+        </p:nvSpPr>
+        <p:spPr/>
+      </p:sp>
+      <p:sp>
+        <p:nvSpPr>
+          <p:cNvPr id="3" name="Notes Placeholder 2"/>
+          <p:cNvSpPr>
+            <a:spLocks noGrp="1"/>
+          </p:cNvSpPr>
+          <p:nvPr>
+            <p:ph type="body" idx="1"/>
+          </p:nvPr>
+        </p:nvSpPr>
+        <p:spPr/>
+        <p:txBody>
+          <a:bodyPr/>
+          <a:lstStyle/>
+          <a:p>
+            <a:r>
+              <a:rPr lang="en-CA" dirty="0" smtClean="0"/>
+              <a:t>Anton</a:t>
+            </a:r>
+            <a:endParaRPr lang="en-CA" dirty="0"/>
+          </a:p>
+        </p:txBody>
+      </p:sp>
+      <p:sp>
+        <p:nvSpPr>
+          <p:cNvPr id="4" name="Slide Number Placeholder 3"/>
+          <p:cNvSpPr>
+            <a:spLocks noGrp="1"/>
+          </p:cNvSpPr>
+          <p:nvPr>
+            <p:ph type="sldNum" sz="quarter" idx="10"/>
+          </p:nvPr>
+        </p:nvSpPr>
+        <p:spPr/>
+        <p:txBody>
+          <a:bodyPr/>
+          <a:lstStyle/>
+          <a:p>
+            <a:fld id="{DEA1FBCD-0745-4DDC-9504-6C151D3D2751}" type="slidenum">
+              <a:rPr lang="en-CA" smtClean="0"/>
+              <a:t>13</a:t>
+            </a:fld>
+            <a:endParaRPr lang="en-CA"/>
+          </a:p>
+        </p:txBody>
+      </p:sp>
+    </p:spTree>
+    <p:extLst>
+      <p:ext uri="{BB962C8B-B14F-4D97-AF65-F5344CB8AC3E}">
+        <p14:creationId xmlns:p14="http://schemas.microsoft.com/office/powerpoint/2010/main" val="3636640376"/>
+      </p:ext>
+    </p:extLst>
+  </p:cSld>
+  <p:clrMapOvr>
+    <a:masterClrMapping/>
+  </p:clrMapOvr>
+</p:notes>
+</file>
+
+<file path=ppt/notesSlides/notesSlide14.xml><?xml version="1.0" encoding="utf-8"?>
+<p:notes xmlns:a="http://schemas.openxmlformats.org/drawingml/2006/main" xmlns:r="http://schemas.openxmlformats.org/officeDocument/2006/relationships" xmlns:p="http://schemas.openxmlformats.org/presentationml/2006/main">
+  <p:cSld>
+    <p:spTree>
+      <p:nvGrpSpPr>
+        <p:cNvPr id="1" name=""/>
+        <p:cNvGrpSpPr/>
+        <p:nvPr/>
+      </p:nvGrpSpPr>
+      <p:grpSpPr>
+        <a:xfrm>
+          <a:off x="0" y="0"/>
+          <a:ext cx="0" cy="0"/>
+          <a:chOff x="0" y="0"/>
+          <a:chExt cx="0" cy="0"/>
+        </a:xfrm>
+      </p:grpSpPr>
+      <p:sp>
+        <p:nvSpPr>
+          <p:cNvPr id="2" name="Slide Image Placeholder 1"/>
+          <p:cNvSpPr>
+            <a:spLocks noGrp="1" noRot="1" noChangeAspect="1"/>
+          </p:cNvSpPr>
+          <p:nvPr>
+            <p:ph type="sldImg"/>
+          </p:nvPr>
+        </p:nvSpPr>
+        <p:spPr/>
+      </p:sp>
+      <p:sp>
+        <p:nvSpPr>
+          <p:cNvPr id="3" name="Notes Placeholder 2"/>
+          <p:cNvSpPr>
+            <a:spLocks noGrp="1"/>
+          </p:cNvSpPr>
+          <p:nvPr>
+            <p:ph type="body" idx="1"/>
+          </p:nvPr>
+        </p:nvSpPr>
+        <p:spPr/>
+        <p:txBody>
+          <a:bodyPr/>
+          <a:lstStyle/>
+          <a:p>
+            <a:r>
+              <a:rPr lang="en-CA" dirty="0" smtClean="0"/>
+              <a:t>Anton</a:t>
+            </a:r>
+            <a:endParaRPr lang="en-CA" dirty="0"/>
+          </a:p>
+        </p:txBody>
+      </p:sp>
+      <p:sp>
+        <p:nvSpPr>
+          <p:cNvPr id="4" name="Slide Number Placeholder 3"/>
+          <p:cNvSpPr>
+            <a:spLocks noGrp="1"/>
+          </p:cNvSpPr>
+          <p:nvPr>
+            <p:ph type="sldNum" sz="quarter" idx="10"/>
+          </p:nvPr>
+        </p:nvSpPr>
+        <p:spPr/>
+        <p:txBody>
+          <a:bodyPr/>
+          <a:lstStyle/>
+          <a:p>
+            <a:fld id="{DEA1FBCD-0745-4DDC-9504-6C151D3D2751}" type="slidenum">
+              <a:rPr lang="en-CA" smtClean="0"/>
+              <a:t>14</a:t>
+            </a:fld>
+            <a:endParaRPr lang="en-CA"/>
+          </a:p>
+        </p:txBody>
+      </p:sp>
+    </p:spTree>
+    <p:extLst>
+      <p:ext uri="{BB962C8B-B14F-4D97-AF65-F5344CB8AC3E}">
+        <p14:creationId xmlns:p14="http://schemas.microsoft.com/office/powerpoint/2010/main" val="2863123788"/>
+      </p:ext>
+    </p:extLst>
+  </p:cSld>
+  <p:clrMapOvr>
+    <a:masterClrMapping/>
+  </p:clrMapOvr>
+</p:notes>
+</file>
+
+<file path=ppt/notesSlides/notesSlide15.xml><?xml version="1.0" encoding="utf-8"?>
+<p:notes xmlns:a="http://schemas.openxmlformats.org/drawingml/2006/main" xmlns:r="http://schemas.openxmlformats.org/officeDocument/2006/relationships" xmlns:p="http://schemas.openxmlformats.org/presentationml/2006/main">
+  <p:cSld>
+    <p:spTree>
+      <p:nvGrpSpPr>
+        <p:cNvPr id="1" name=""/>
+        <p:cNvGrpSpPr/>
+        <p:nvPr/>
+      </p:nvGrpSpPr>
+      <p:grpSpPr>
+        <a:xfrm>
+          <a:off x="0" y="0"/>
+          <a:ext cx="0" cy="0"/>
+          <a:chOff x="0" y="0"/>
+          <a:chExt cx="0" cy="0"/>
+        </a:xfrm>
+      </p:grpSpPr>
+      <p:sp>
+        <p:nvSpPr>
+          <p:cNvPr id="2" name="Slide Image Placeholder 1"/>
+          <p:cNvSpPr>
+            <a:spLocks noGrp="1" noRot="1" noChangeAspect="1"/>
+          </p:cNvSpPr>
+          <p:nvPr>
+            <p:ph type="sldImg"/>
+          </p:nvPr>
+        </p:nvSpPr>
+        <p:spPr/>
+      </p:sp>
+      <p:sp>
+        <p:nvSpPr>
+          <p:cNvPr id="3" name="Notes Placeholder 2"/>
+          <p:cNvSpPr>
+            <a:spLocks noGrp="1"/>
+          </p:cNvSpPr>
+          <p:nvPr>
+            <p:ph type="body" idx="1"/>
+          </p:nvPr>
+        </p:nvSpPr>
+        <p:spPr/>
+        <p:txBody>
+          <a:bodyPr/>
+          <a:lstStyle/>
+          <a:p>
+            <a:r>
+              <a:rPr lang="en-CA" dirty="0" smtClean="0"/>
+              <a:t>Shawn</a:t>
+            </a:r>
+            <a:endParaRPr lang="en-CA" dirty="0"/>
+          </a:p>
+        </p:txBody>
+      </p:sp>
+      <p:sp>
+        <p:nvSpPr>
+          <p:cNvPr id="4" name="Slide Number Placeholder 3"/>
+          <p:cNvSpPr>
+            <a:spLocks noGrp="1"/>
+          </p:cNvSpPr>
+          <p:nvPr>
+            <p:ph type="sldNum" sz="quarter" idx="10"/>
+          </p:nvPr>
+        </p:nvSpPr>
+        <p:spPr/>
+        <p:txBody>
+          <a:bodyPr/>
+          <a:lstStyle/>
+          <a:p>
+            <a:fld id="{DEA1FBCD-0745-4DDC-9504-6C151D3D2751}" type="slidenum">
+              <a:rPr lang="en-CA" smtClean="0"/>
+              <a:t>15</a:t>
+            </a:fld>
+            <a:endParaRPr lang="en-CA"/>
+          </a:p>
+        </p:txBody>
+      </p:sp>
+    </p:spTree>
+    <p:extLst>
+      <p:ext uri="{BB962C8B-B14F-4D97-AF65-F5344CB8AC3E}">
+        <p14:creationId xmlns:p14="http://schemas.microsoft.com/office/powerpoint/2010/main" val="2428560927"/>
+      </p:ext>
+    </p:extLst>
+  </p:cSld>
+  <p:clrMapOvr>
+    <a:masterClrMapping/>
+  </p:clrMapOvr>
+</p:notes>
+</file>
+
+<file path=ppt/notesSlides/notesSlide2.xml><?xml version="1.0" encoding="utf-8"?>
+<p:notes xmlns:a="http://schemas.openxmlformats.org/drawingml/2006/main" xmlns:r="http://schemas.openxmlformats.org/officeDocument/2006/relationships" xmlns:p="http://schemas.openxmlformats.org/presentationml/2006/main">
+  <p:cSld>
+    <p:spTree>
+      <p:nvGrpSpPr>
+        <p:cNvPr id="1" name=""/>
+        <p:cNvGrpSpPr/>
+        <p:nvPr/>
+      </p:nvGrpSpPr>
+      <p:grpSpPr>
+        <a:xfrm>
+          <a:off x="0" y="0"/>
+          <a:ext cx="0" cy="0"/>
+          <a:chOff x="0" y="0"/>
+          <a:chExt cx="0" cy="0"/>
+        </a:xfrm>
+      </p:grpSpPr>
+      <p:sp>
+        <p:nvSpPr>
+          <p:cNvPr id="2" name="Slide Image Placeholder 1"/>
+          <p:cNvSpPr>
+            <a:spLocks noGrp="1" noRot="1" noChangeAspect="1"/>
+          </p:cNvSpPr>
+          <p:nvPr>
+            <p:ph type="sldImg"/>
+          </p:nvPr>
+        </p:nvSpPr>
+        <p:spPr/>
+      </p:sp>
+      <p:sp>
+        <p:nvSpPr>
+          <p:cNvPr id="3" name="Notes Placeholder 2"/>
+          <p:cNvSpPr>
+            <a:spLocks noGrp="1"/>
+          </p:cNvSpPr>
+          <p:nvPr>
+            <p:ph type="body" idx="1"/>
+          </p:nvPr>
+        </p:nvSpPr>
+        <p:spPr/>
+        <p:txBody>
+          <a:bodyPr/>
+          <a:lstStyle/>
+          <a:p>
+            <a:r>
+              <a:rPr lang="en-CA" dirty="0" smtClean="0"/>
+              <a:t>Shawn</a:t>
+            </a:r>
+            <a:endParaRPr lang="en-CA" dirty="0"/>
+          </a:p>
+        </p:txBody>
+      </p:sp>
+      <p:sp>
+        <p:nvSpPr>
+          <p:cNvPr id="4" name="Slide Number Placeholder 3"/>
+          <p:cNvSpPr>
+            <a:spLocks noGrp="1"/>
+          </p:cNvSpPr>
+          <p:nvPr>
+            <p:ph type="sldNum" sz="quarter" idx="10"/>
+          </p:nvPr>
+        </p:nvSpPr>
+        <p:spPr/>
+        <p:txBody>
+          <a:bodyPr/>
+          <a:lstStyle/>
+          <a:p>
+            <a:fld id="{DEA1FBCD-0745-4DDC-9504-6C151D3D2751}" type="slidenum">
+              <a:rPr lang="en-CA" smtClean="0"/>
+              <a:t>2</a:t>
+            </a:fld>
+            <a:endParaRPr lang="en-CA"/>
+          </a:p>
+        </p:txBody>
+      </p:sp>
+    </p:spTree>
+    <p:extLst>
+      <p:ext uri="{BB962C8B-B14F-4D97-AF65-F5344CB8AC3E}">
+        <p14:creationId xmlns:p14="http://schemas.microsoft.com/office/powerpoint/2010/main" val="1939809098"/>
+      </p:ext>
+    </p:extLst>
+  </p:cSld>
+  <p:clrMapOvr>
+    <a:masterClrMapping/>
+  </p:clrMapOvr>
+</p:notes>
+</file>
+
+<file path=ppt/notesSlides/notesSlide3.xml><?xml version="1.0" encoding="utf-8"?>
+<p:notes xmlns:a="http://schemas.openxmlformats.org/drawingml/2006/main" xmlns:r="http://schemas.openxmlformats.org/officeDocument/2006/relationships" xmlns:p="http://schemas.openxmlformats.org/presentationml/2006/main">
+  <p:cSld>
+    <p:spTree>
+      <p:nvGrpSpPr>
+        <p:cNvPr id="1" name=""/>
+        <p:cNvGrpSpPr/>
+        <p:nvPr/>
+      </p:nvGrpSpPr>
+      <p:grpSpPr>
+        <a:xfrm>
+          <a:off x="0" y="0"/>
+          <a:ext cx="0" cy="0"/>
+          <a:chOff x="0" y="0"/>
+          <a:chExt cx="0" cy="0"/>
+        </a:xfrm>
+      </p:grpSpPr>
+      <p:sp>
+        <p:nvSpPr>
+          <p:cNvPr id="2" name="Slide Image Placeholder 1"/>
+          <p:cNvSpPr>
+            <a:spLocks noGrp="1" noRot="1" noChangeAspect="1"/>
+          </p:cNvSpPr>
+          <p:nvPr>
+            <p:ph type="sldImg"/>
+          </p:nvPr>
+        </p:nvSpPr>
+        <p:spPr/>
+      </p:sp>
+      <p:sp>
+        <p:nvSpPr>
+          <p:cNvPr id="3" name="Notes Placeholder 2"/>
+          <p:cNvSpPr>
+            <a:spLocks noGrp="1"/>
+          </p:cNvSpPr>
+          <p:nvPr>
+            <p:ph type="body" idx="1"/>
+          </p:nvPr>
+        </p:nvSpPr>
+        <p:spPr/>
+        <p:txBody>
+          <a:bodyPr/>
+          <a:lstStyle/>
+          <a:p>
+            <a:r>
+              <a:rPr lang="en-CA" dirty="0" smtClean="0"/>
+              <a:t>Shawn</a:t>
+            </a:r>
+            <a:endParaRPr lang="en-CA" dirty="0"/>
+          </a:p>
+        </p:txBody>
+      </p:sp>
+      <p:sp>
+        <p:nvSpPr>
+          <p:cNvPr id="4" name="Slide Number Placeholder 3"/>
+          <p:cNvSpPr>
+            <a:spLocks noGrp="1"/>
+          </p:cNvSpPr>
+          <p:nvPr>
+            <p:ph type="sldNum" sz="quarter" idx="10"/>
+          </p:nvPr>
+        </p:nvSpPr>
+        <p:spPr/>
+        <p:txBody>
+          <a:bodyPr/>
+          <a:lstStyle/>
+          <a:p>
+            <a:fld id="{DEA1FBCD-0745-4DDC-9504-6C151D3D2751}" type="slidenum">
+              <a:rPr lang="en-CA" smtClean="0"/>
+              <a:t>3</a:t>
+            </a:fld>
+            <a:endParaRPr lang="en-CA"/>
+          </a:p>
+        </p:txBody>
+      </p:sp>
+    </p:spTree>
+    <p:extLst>
+      <p:ext uri="{BB962C8B-B14F-4D97-AF65-F5344CB8AC3E}">
+        <p14:creationId xmlns:p14="http://schemas.microsoft.com/office/powerpoint/2010/main" val="1389840465"/>
+      </p:ext>
+    </p:extLst>
+  </p:cSld>
+  <p:clrMapOvr>
+    <a:masterClrMapping/>
+  </p:clrMapOvr>
+</p:notes>
+</file>
+
+<file path=ppt/notesSlides/notesSlide4.xml><?xml version="1.0" encoding="utf-8"?>
+<p:notes xmlns:a="http://schemas.openxmlformats.org/drawingml/2006/main" xmlns:r="http://schemas.openxmlformats.org/officeDocument/2006/relationships" xmlns:p="http://schemas.openxmlformats.org/presentationml/2006/main">
+  <p:cSld>
+    <p:spTree>
+      <p:nvGrpSpPr>
+        <p:cNvPr id="1" name=""/>
+        <p:cNvGrpSpPr/>
+        <p:nvPr/>
+      </p:nvGrpSpPr>
+      <p:grpSpPr>
+        <a:xfrm>
+          <a:off x="0" y="0"/>
+          <a:ext cx="0" cy="0"/>
+          <a:chOff x="0" y="0"/>
+          <a:chExt cx="0" cy="0"/>
+        </a:xfrm>
+      </p:grpSpPr>
+      <p:sp>
+        <p:nvSpPr>
+          <p:cNvPr id="2" name="Slide Image Placeholder 1"/>
+          <p:cNvSpPr>
+            <a:spLocks noGrp="1" noRot="1" noChangeAspect="1"/>
+          </p:cNvSpPr>
+          <p:nvPr>
+            <p:ph type="sldImg"/>
+          </p:nvPr>
+        </p:nvSpPr>
+        <p:spPr/>
+      </p:sp>
+      <p:sp>
+        <p:nvSpPr>
+          <p:cNvPr id="3" name="Notes Placeholder 2"/>
+          <p:cNvSpPr>
+            <a:spLocks noGrp="1"/>
+          </p:cNvSpPr>
+          <p:nvPr>
+            <p:ph type="body" idx="1"/>
+          </p:nvPr>
+        </p:nvSpPr>
+        <p:spPr/>
+        <p:txBody>
+          <a:bodyPr/>
+          <a:lstStyle/>
+          <a:p>
+            <a:r>
+              <a:rPr lang="en-CA" dirty="0" smtClean="0"/>
+              <a:t>Anton</a:t>
+            </a:r>
+            <a:endParaRPr lang="en-CA" dirty="0"/>
+          </a:p>
+        </p:txBody>
+      </p:sp>
+      <p:sp>
+        <p:nvSpPr>
+          <p:cNvPr id="4" name="Slide Number Placeholder 3"/>
+          <p:cNvSpPr>
+            <a:spLocks noGrp="1"/>
+          </p:cNvSpPr>
+          <p:nvPr>
+            <p:ph type="sldNum" sz="quarter" idx="10"/>
+          </p:nvPr>
+        </p:nvSpPr>
+        <p:spPr/>
+        <p:txBody>
+          <a:bodyPr/>
+          <a:lstStyle/>
+          <a:p>
+            <a:fld id="{DEA1FBCD-0745-4DDC-9504-6C151D3D2751}" type="slidenum">
+              <a:rPr lang="en-CA" smtClean="0"/>
+              <a:t>4</a:t>
+            </a:fld>
+            <a:endParaRPr lang="en-CA"/>
+          </a:p>
+        </p:txBody>
+      </p:sp>
+    </p:spTree>
+    <p:extLst>
+      <p:ext uri="{BB962C8B-B14F-4D97-AF65-F5344CB8AC3E}">
+        <p14:creationId xmlns:p14="http://schemas.microsoft.com/office/powerpoint/2010/main" val="1278866260"/>
+      </p:ext>
+    </p:extLst>
+  </p:cSld>
+  <p:clrMapOvr>
+    <a:masterClrMapping/>
+  </p:clrMapOvr>
+</p:notes>
+</file>
+
+<file path=ppt/notesSlides/notesSlide5.xml><?xml version="1.0" encoding="utf-8"?>
+<p:notes xmlns:a="http://schemas.openxmlformats.org/drawingml/2006/main" xmlns:r="http://schemas.openxmlformats.org/officeDocument/2006/relationships" xmlns:p="http://schemas.openxmlformats.org/presentationml/2006/main">
+  <p:cSld>
+    <p:spTree>
+      <p:nvGrpSpPr>
+        <p:cNvPr id="1" name=""/>
+        <p:cNvGrpSpPr/>
+        <p:nvPr/>
+      </p:nvGrpSpPr>
+      <p:grpSpPr>
+        <a:xfrm>
+          <a:off x="0" y="0"/>
+          <a:ext cx="0" cy="0"/>
+          <a:chOff x="0" y="0"/>
+          <a:chExt cx="0" cy="0"/>
+        </a:xfrm>
+      </p:grpSpPr>
+      <p:sp>
+        <p:nvSpPr>
+          <p:cNvPr id="2" name="Slide Image Placeholder 1"/>
+          <p:cNvSpPr>
+            <a:spLocks noGrp="1" noRot="1" noChangeAspect="1"/>
+          </p:cNvSpPr>
+          <p:nvPr>
+            <p:ph type="sldImg"/>
+          </p:nvPr>
+        </p:nvSpPr>
+        <p:spPr/>
+      </p:sp>
+      <p:sp>
+        <p:nvSpPr>
+          <p:cNvPr id="3" name="Notes Placeholder 2"/>
+          <p:cNvSpPr>
+            <a:spLocks noGrp="1"/>
+          </p:cNvSpPr>
+          <p:nvPr>
+            <p:ph type="body" idx="1"/>
+          </p:nvPr>
+        </p:nvSpPr>
+        <p:spPr/>
+        <p:txBody>
+          <a:bodyPr/>
+          <a:lstStyle/>
+          <a:p>
+            <a:r>
+              <a:rPr lang="en-CA" dirty="0" smtClean="0"/>
+              <a:t>Shawn</a:t>
+            </a:r>
+            <a:endParaRPr lang="en-CA" dirty="0"/>
+          </a:p>
+        </p:txBody>
+      </p:sp>
+      <p:sp>
+        <p:nvSpPr>
+          <p:cNvPr id="4" name="Slide Number Placeholder 3"/>
+          <p:cNvSpPr>
+            <a:spLocks noGrp="1"/>
+          </p:cNvSpPr>
+          <p:nvPr>
+            <p:ph type="sldNum" sz="quarter" idx="10"/>
+          </p:nvPr>
+        </p:nvSpPr>
+        <p:spPr/>
+        <p:txBody>
+          <a:bodyPr/>
+          <a:lstStyle/>
+          <a:p>
+            <a:fld id="{DEA1FBCD-0745-4DDC-9504-6C151D3D2751}" type="slidenum">
+              <a:rPr lang="en-CA" smtClean="0"/>
+              <a:t>5</a:t>
+            </a:fld>
+            <a:endParaRPr lang="en-CA"/>
+          </a:p>
+        </p:txBody>
+      </p:sp>
+    </p:spTree>
+    <p:extLst>
+      <p:ext uri="{BB962C8B-B14F-4D97-AF65-F5344CB8AC3E}">
+        <p14:creationId xmlns:p14="http://schemas.microsoft.com/office/powerpoint/2010/main" val="1509167819"/>
+      </p:ext>
+    </p:extLst>
+  </p:cSld>
+  <p:clrMapOvr>
+    <a:masterClrMapping/>
+  </p:clrMapOvr>
+</p:notes>
+</file>
+
+<file path=ppt/notesSlides/notesSlide6.xml><?xml version="1.0" encoding="utf-8"?>
+<p:notes xmlns:a="http://schemas.openxmlformats.org/drawingml/2006/main" xmlns:r="http://schemas.openxmlformats.org/officeDocument/2006/relationships" xmlns:p="http://schemas.openxmlformats.org/presentationml/2006/main">
+  <p:cSld>
+    <p:spTree>
+      <p:nvGrpSpPr>
+        <p:cNvPr id="1" name=""/>
+        <p:cNvGrpSpPr/>
+        <p:nvPr/>
+      </p:nvGrpSpPr>
+      <p:grpSpPr>
+        <a:xfrm>
+          <a:off x="0" y="0"/>
+          <a:ext cx="0" cy="0"/>
+          <a:chOff x="0" y="0"/>
+          <a:chExt cx="0" cy="0"/>
+        </a:xfrm>
+      </p:grpSpPr>
+      <p:sp>
+        <p:nvSpPr>
+          <p:cNvPr id="2" name="Slide Image Placeholder 1"/>
+          <p:cNvSpPr>
+            <a:spLocks noGrp="1" noRot="1" noChangeAspect="1"/>
+          </p:cNvSpPr>
+          <p:nvPr>
+            <p:ph type="sldImg"/>
+          </p:nvPr>
+        </p:nvSpPr>
+        <p:spPr/>
+      </p:sp>
+      <p:sp>
+        <p:nvSpPr>
+          <p:cNvPr id="3" name="Notes Placeholder 2"/>
+          <p:cNvSpPr>
+            <a:spLocks noGrp="1"/>
+          </p:cNvSpPr>
+          <p:nvPr>
+            <p:ph type="body" idx="1"/>
+          </p:nvPr>
+        </p:nvSpPr>
+        <p:spPr/>
+        <p:txBody>
+          <a:bodyPr/>
+          <a:lstStyle/>
+          <a:p>
+            <a:r>
+              <a:rPr lang="en-CA" dirty="0" smtClean="0"/>
+              <a:t>Anton</a:t>
+            </a:r>
+            <a:endParaRPr lang="en-CA" dirty="0"/>
+          </a:p>
+        </p:txBody>
+      </p:sp>
+      <p:sp>
+        <p:nvSpPr>
+          <p:cNvPr id="4" name="Slide Number Placeholder 3"/>
+          <p:cNvSpPr>
+            <a:spLocks noGrp="1"/>
+          </p:cNvSpPr>
+          <p:nvPr>
+            <p:ph type="sldNum" sz="quarter" idx="10"/>
+          </p:nvPr>
+        </p:nvSpPr>
+        <p:spPr/>
+        <p:txBody>
+          <a:bodyPr/>
+          <a:lstStyle/>
+          <a:p>
+            <a:fld id="{DEA1FBCD-0745-4DDC-9504-6C151D3D2751}" type="slidenum">
+              <a:rPr lang="en-CA" smtClean="0"/>
+              <a:t>6</a:t>
+            </a:fld>
+            <a:endParaRPr lang="en-CA"/>
+          </a:p>
+        </p:txBody>
+      </p:sp>
+    </p:spTree>
+    <p:extLst>
+      <p:ext uri="{BB962C8B-B14F-4D97-AF65-F5344CB8AC3E}">
+        <p14:creationId xmlns:p14="http://schemas.microsoft.com/office/powerpoint/2010/main" val="3059836385"/>
+      </p:ext>
+    </p:extLst>
+  </p:cSld>
+  <p:clrMapOvr>
+    <a:masterClrMapping/>
+  </p:clrMapOvr>
+</p:notes>
+</file>
+
+<file path=ppt/notesSlides/notesSlide7.xml><?xml version="1.0" encoding="utf-8"?>
+<p:notes xmlns:a="http://schemas.openxmlformats.org/drawingml/2006/main" xmlns:r="http://schemas.openxmlformats.org/officeDocument/2006/relationships" xmlns:p="http://schemas.openxmlformats.org/presentationml/2006/main">
+  <p:cSld>
+    <p:spTree>
+      <p:nvGrpSpPr>
+        <p:cNvPr id="1" name=""/>
+        <p:cNvGrpSpPr/>
+        <p:nvPr/>
+      </p:nvGrpSpPr>
+      <p:grpSpPr>
+        <a:xfrm>
+          <a:off x="0" y="0"/>
+          <a:ext cx="0" cy="0"/>
+          <a:chOff x="0" y="0"/>
+          <a:chExt cx="0" cy="0"/>
+        </a:xfrm>
+      </p:grpSpPr>
+      <p:sp>
+        <p:nvSpPr>
+          <p:cNvPr id="2" name="Slide Image Placeholder 1"/>
+          <p:cNvSpPr>
+            <a:spLocks noGrp="1" noRot="1" noChangeAspect="1"/>
+          </p:cNvSpPr>
+          <p:nvPr>
+            <p:ph type="sldImg"/>
+          </p:nvPr>
+        </p:nvSpPr>
+        <p:spPr/>
+      </p:sp>
+      <p:sp>
+        <p:nvSpPr>
+          <p:cNvPr id="3" name="Notes Placeholder 2"/>
+          <p:cNvSpPr>
+            <a:spLocks noGrp="1"/>
+          </p:cNvSpPr>
+          <p:nvPr>
+            <p:ph type="body" idx="1"/>
+          </p:nvPr>
+        </p:nvSpPr>
+        <p:spPr/>
+        <p:txBody>
+          <a:bodyPr/>
+          <a:lstStyle/>
+          <a:p>
+            <a:r>
+              <a:rPr lang="en-CA" dirty="0" smtClean="0"/>
+              <a:t>Anton</a:t>
+            </a:r>
+            <a:endParaRPr lang="en-CA" dirty="0"/>
+          </a:p>
+        </p:txBody>
+      </p:sp>
+      <p:sp>
+        <p:nvSpPr>
+          <p:cNvPr id="4" name="Slide Number Placeholder 3"/>
+          <p:cNvSpPr>
+            <a:spLocks noGrp="1"/>
+          </p:cNvSpPr>
+          <p:nvPr>
+            <p:ph type="sldNum" sz="quarter" idx="10"/>
+          </p:nvPr>
+        </p:nvSpPr>
+        <p:spPr/>
+        <p:txBody>
+          <a:bodyPr/>
+          <a:lstStyle/>
+          <a:p>
+            <a:fld id="{DEA1FBCD-0745-4DDC-9504-6C151D3D2751}" type="slidenum">
+              <a:rPr lang="en-CA" smtClean="0"/>
+              <a:t>7</a:t>
+            </a:fld>
+            <a:endParaRPr lang="en-CA"/>
+          </a:p>
+        </p:txBody>
+      </p:sp>
+    </p:spTree>
+    <p:extLst>
+      <p:ext uri="{BB962C8B-B14F-4D97-AF65-F5344CB8AC3E}">
+        <p14:creationId xmlns:p14="http://schemas.microsoft.com/office/powerpoint/2010/main" val="562794154"/>
+      </p:ext>
+    </p:extLst>
+  </p:cSld>
+  <p:clrMapOvr>
+    <a:masterClrMapping/>
+  </p:clrMapOvr>
+</p:notes>
+</file>
+
+<file path=ppt/notesSlides/notesSlide8.xml><?xml version="1.0" encoding="utf-8"?>
+<p:notes xmlns:a="http://schemas.openxmlformats.org/drawingml/2006/main" xmlns:r="http://schemas.openxmlformats.org/officeDocument/2006/relationships" xmlns:p="http://schemas.openxmlformats.org/presentationml/2006/main">
+  <p:cSld>
+    <p:spTree>
+      <p:nvGrpSpPr>
+        <p:cNvPr id="1" name=""/>
+        <p:cNvGrpSpPr/>
+        <p:nvPr/>
+      </p:nvGrpSpPr>
+      <p:grpSpPr>
+        <a:xfrm>
+          <a:off x="0" y="0"/>
+          <a:ext cx="0" cy="0"/>
+          <a:chOff x="0" y="0"/>
+          <a:chExt cx="0" cy="0"/>
+        </a:xfrm>
+      </p:grpSpPr>
+      <p:sp>
+        <p:nvSpPr>
+          <p:cNvPr id="2" name="Slide Image Placeholder 1"/>
+          <p:cNvSpPr>
+            <a:spLocks noGrp="1" noRot="1" noChangeAspect="1"/>
+          </p:cNvSpPr>
+          <p:nvPr>
+            <p:ph type="sldImg"/>
+          </p:nvPr>
+        </p:nvSpPr>
+        <p:spPr/>
+      </p:sp>
+      <p:sp>
+        <p:nvSpPr>
+          <p:cNvPr id="3" name="Notes Placeholder 2"/>
+          <p:cNvSpPr>
+            <a:spLocks noGrp="1"/>
+          </p:cNvSpPr>
+          <p:nvPr>
+            <p:ph type="body" idx="1"/>
+          </p:nvPr>
+        </p:nvSpPr>
+        <p:spPr/>
+        <p:txBody>
+          <a:bodyPr/>
+          <a:lstStyle/>
+          <a:p>
+            <a:r>
+              <a:rPr lang="en-CA" dirty="0" smtClean="0"/>
+              <a:t>Shawn</a:t>
+            </a:r>
+            <a:endParaRPr lang="en-CA" dirty="0"/>
+          </a:p>
+        </p:txBody>
+      </p:sp>
+      <p:sp>
+        <p:nvSpPr>
+          <p:cNvPr id="4" name="Slide Number Placeholder 3"/>
+          <p:cNvSpPr>
+            <a:spLocks noGrp="1"/>
+          </p:cNvSpPr>
+          <p:nvPr>
+            <p:ph type="sldNum" sz="quarter" idx="10"/>
+          </p:nvPr>
+        </p:nvSpPr>
+        <p:spPr/>
+        <p:txBody>
+          <a:bodyPr/>
+          <a:lstStyle/>
+          <a:p>
+            <a:fld id="{DEA1FBCD-0745-4DDC-9504-6C151D3D2751}" type="slidenum">
+              <a:rPr lang="en-CA" smtClean="0"/>
+              <a:t>8</a:t>
+            </a:fld>
+            <a:endParaRPr lang="en-CA"/>
+          </a:p>
+        </p:txBody>
+      </p:sp>
+    </p:spTree>
+    <p:extLst>
+      <p:ext uri="{BB962C8B-B14F-4D97-AF65-F5344CB8AC3E}">
+        <p14:creationId xmlns:p14="http://schemas.microsoft.com/office/powerpoint/2010/main" val="1484975846"/>
+      </p:ext>
+    </p:extLst>
+  </p:cSld>
+  <p:clrMapOvr>
+    <a:masterClrMapping/>
+  </p:clrMapOvr>
+</p:notes>
+</file>
+
+<file path=ppt/notesSlides/notesSlide9.xml><?xml version="1.0" encoding="utf-8"?>
+<p:notes xmlns:a="http://schemas.openxmlformats.org/drawingml/2006/main" xmlns:r="http://schemas.openxmlformats.org/officeDocument/2006/relationships" xmlns:p="http://schemas.openxmlformats.org/presentationml/2006/main">
+  <p:cSld>
+    <p:spTree>
+      <p:nvGrpSpPr>
+        <p:cNvPr id="1" name=""/>
+        <p:cNvGrpSpPr/>
+        <p:nvPr/>
+      </p:nvGrpSpPr>
+      <p:grpSpPr>
+        <a:xfrm>
+          <a:off x="0" y="0"/>
+          <a:ext cx="0" cy="0"/>
+          <a:chOff x="0" y="0"/>
+          <a:chExt cx="0" cy="0"/>
+        </a:xfrm>
+      </p:grpSpPr>
+      <p:sp>
+        <p:nvSpPr>
+          <p:cNvPr id="2" name="Slide Image Placeholder 1"/>
+          <p:cNvSpPr>
+            <a:spLocks noGrp="1" noRot="1" noChangeAspect="1"/>
+          </p:cNvSpPr>
+          <p:nvPr>
+            <p:ph type="sldImg"/>
+          </p:nvPr>
+        </p:nvSpPr>
+        <p:spPr/>
+      </p:sp>
+      <p:sp>
+        <p:nvSpPr>
+          <p:cNvPr id="3" name="Notes Placeholder 2"/>
+          <p:cNvSpPr>
+            <a:spLocks noGrp="1"/>
+          </p:cNvSpPr>
+          <p:nvPr>
+            <p:ph type="body" idx="1"/>
+          </p:nvPr>
+        </p:nvSpPr>
+        <p:spPr/>
+        <p:txBody>
+          <a:bodyPr/>
+          <a:lstStyle/>
+          <a:p>
+            <a:r>
+              <a:rPr lang="en-CA" dirty="0" smtClean="0"/>
+              <a:t>Shawn</a:t>
+            </a:r>
+            <a:endParaRPr lang="en-CA" dirty="0"/>
+          </a:p>
+        </p:txBody>
+      </p:sp>
+      <p:sp>
+        <p:nvSpPr>
+          <p:cNvPr id="4" name="Slide Number Placeholder 3"/>
+          <p:cNvSpPr>
+            <a:spLocks noGrp="1"/>
+          </p:cNvSpPr>
+          <p:nvPr>
+            <p:ph type="sldNum" sz="quarter" idx="10"/>
+          </p:nvPr>
+        </p:nvSpPr>
+        <p:spPr/>
+        <p:txBody>
+          <a:bodyPr/>
+          <a:lstStyle/>
+          <a:p>
+            <a:fld id="{DEA1FBCD-0745-4DDC-9504-6C151D3D2751}" type="slidenum">
+              <a:rPr lang="en-CA" smtClean="0"/>
+              <a:t>9</a:t>
+            </a:fld>
+            <a:endParaRPr lang="en-CA"/>
+          </a:p>
+        </p:txBody>
+      </p:sp>
+    </p:spTree>
+    <p:extLst>
+      <p:ext uri="{BB962C8B-B14F-4D97-AF65-F5344CB8AC3E}">
+        <p14:creationId xmlns:p14="http://schemas.microsoft.com/office/powerpoint/2010/main" val="4055100563"/>
+      </p:ext>
+    </p:extLst>
+  </p:cSld>
+  <p:clrMapOvr>
+    <a:masterClrMapping/>
+  </p:clrMapOvr>
+</p:notes>
+</file>
+
 <file path=ppt/slideLayouts/slideLayout1.xml><?xml version="1.0" encoding="utf-8"?>
 <p:sldLayout xmlns:a="http://schemas.openxmlformats.org/drawingml/2006/main" xmlns:r="http://schemas.openxmlformats.org/officeDocument/2006/relationships" xmlns:p="http://schemas.openxmlformats.org/presentationml/2006/main" type="title" preserve="1">
   <p:cSld name="Title Slide">
@@ -325,7 +1998,7 @@
           <a:p>
             <a:fld id="{6EA3E9C6-D988-452F-9C00-5DEE413B1A0F}" type="datetimeFigureOut">
               <a:rPr lang="en-CA" smtClean="0"/>
-              <a:t>27/03/2015</a:t>
+              <a:t>2015-03-27</a:t>
             </a:fld>
             <a:endParaRPr lang="en-CA"/>
           </a:p>
@@ -490,7 +2163,7 @@
           <a:p>
             <a:fld id="{6EA3E9C6-D988-452F-9C00-5DEE413B1A0F}" type="datetimeFigureOut">
               <a:rPr lang="en-CA" smtClean="0"/>
-              <a:t>27/03/2015</a:t>
+              <a:t>2015-03-27</a:t>
             </a:fld>
             <a:endParaRPr lang="en-CA"/>
           </a:p>
@@ -665,7 +2338,7 @@
           <a:p>
             <a:fld id="{6EA3E9C6-D988-452F-9C00-5DEE413B1A0F}" type="datetimeFigureOut">
               <a:rPr lang="en-CA" smtClean="0"/>
-              <a:t>27/03/2015</a:t>
+              <a:t>2015-03-27</a:t>
             </a:fld>
             <a:endParaRPr lang="en-CA"/>
           </a:p>
@@ -830,7 +2503,7 @@
           <a:p>
             <a:fld id="{6EA3E9C6-D988-452F-9C00-5DEE413B1A0F}" type="datetimeFigureOut">
               <a:rPr lang="en-CA" smtClean="0"/>
-              <a:t>27/03/2015</a:t>
+              <a:t>2015-03-27</a:t>
             </a:fld>
             <a:endParaRPr lang="en-CA"/>
           </a:p>
@@ -1069,7 +2742,7 @@
           <a:p>
             <a:fld id="{6EA3E9C6-D988-452F-9C00-5DEE413B1A0F}" type="datetimeFigureOut">
               <a:rPr lang="en-CA" smtClean="0"/>
-              <a:t>27/03/2015</a:t>
+              <a:t>2015-03-27</a:t>
             </a:fld>
             <a:endParaRPr lang="en-CA"/>
           </a:p>
@@ -1159,7 +2832,7 @@
           <a:p>
             <a:fld id="{6EA3E9C6-D988-452F-9C00-5DEE413B1A0F}" type="datetimeFigureOut">
               <a:rPr lang="en-CA" smtClean="0"/>
-              <a:t>27/03/2015</a:t>
+              <a:t>2015-03-27</a:t>
             </a:fld>
             <a:endParaRPr lang="en-CA"/>
           </a:p>
@@ -1533,7 +3206,7 @@
           <a:p>
             <a:fld id="{6EA3E9C6-D988-452F-9C00-5DEE413B1A0F}" type="datetimeFigureOut">
               <a:rPr lang="en-CA" smtClean="0"/>
-              <a:t>27/03/2015</a:t>
+              <a:t>2015-03-27</a:t>
             </a:fld>
             <a:endParaRPr lang="en-CA"/>
           </a:p>
@@ -1788,7 +3461,7 @@
           <a:p>
             <a:fld id="{6EA3E9C6-D988-452F-9C00-5DEE413B1A0F}" type="datetimeFigureOut">
               <a:rPr lang="en-CA" smtClean="0"/>
-              <a:t>27/03/2015</a:t>
+              <a:t>2015-03-27</a:t>
             </a:fld>
             <a:endParaRPr lang="en-CA"/>
           </a:p>
@@ -1878,7 +3551,7 @@
           <a:p>
             <a:fld id="{6EA3E9C6-D988-452F-9C00-5DEE413B1A0F}" type="datetimeFigureOut">
               <a:rPr lang="en-CA" smtClean="0"/>
-              <a:t>27/03/2015</a:t>
+              <a:t>2015-03-27</a:t>
             </a:fld>
             <a:endParaRPr lang="en-CA"/>
           </a:p>
@@ -2152,7 +3825,7 @@
           <a:p>
             <a:fld id="{6EA3E9C6-D988-452F-9C00-5DEE413B1A0F}" type="datetimeFigureOut">
               <a:rPr lang="en-CA" smtClean="0"/>
-              <a:t>27/03/2015</a:t>
+              <a:t>2015-03-27</a:t>
             </a:fld>
             <a:endParaRPr lang="en-CA"/>
           </a:p>
@@ -2424,7 +4097,7 @@
           <a:p>
             <a:fld id="{6EA3E9C6-D988-452F-9C00-5DEE413B1A0F}" type="datetimeFigureOut">
               <a:rPr lang="en-CA" smtClean="0"/>
-              <a:t>27/03/2015</a:t>
+              <a:t>2015-03-27</a:t>
             </a:fld>
             <a:endParaRPr lang="en-CA"/>
           </a:p>
@@ -2724,7 +4397,7 @@
           <a:p>
             <a:fld id="{6EA3E9C6-D988-452F-9C00-5DEE413B1A0F}" type="datetimeFigureOut">
               <a:rPr lang="en-CA" smtClean="0"/>
-              <a:t>27/03/2015</a:t>
+              <a:t>2015-03-27</a:t>
             </a:fld>
             <a:endParaRPr lang="en-CA"/>
           </a:p>
@@ -3198,11 +4871,7 @@
             <a:pPr algn="ctr"/>
             <a:r>
               <a:rPr lang="en-CA" dirty="0" smtClean="0"/>
-              <a:t>Secure Android Application for Patient </a:t>
-            </a:r>
-            <a:r>
-              <a:rPr lang="en-CA" dirty="0" smtClean="0"/>
-              <a:t>Information</a:t>
+              <a:t>Secure Android Application for Patient Information</a:t>
             </a:r>
             <a:endParaRPr lang="en-CA" dirty="0"/>
           </a:p>
@@ -3550,7 +5219,7 @@
           </p:nvPr>
         </p:nvPicPr>
         <p:blipFill>
-          <a:blip r:embed="rId2" cstate="print">
+          <a:blip r:embed="rId3" cstate="print">
             <a:extLst>
               <a:ext uri="{28A0092B-C50C-407E-A947-70E740481C1C}">
                 <a14:useLocalDpi xmlns:a14="http://schemas.microsoft.com/office/drawing/2010/main" val="0"/>
@@ -3759,7 +5428,7 @@
           </p:nvPr>
         </p:nvPicPr>
         <p:blipFill>
-          <a:blip r:embed="rId2" cstate="print">
+          <a:blip r:embed="rId3" cstate="print">
             <a:extLst>
               <a:ext uri="{28A0092B-C50C-407E-A947-70E740481C1C}">
                 <a14:useLocalDpi xmlns:a14="http://schemas.microsoft.com/office/drawing/2010/main" val="0"/>
@@ -3879,6 +5548,52 @@
           </a:p>
         </p:txBody>
       </p:sp>
+      <p:sp>
+        <p:nvSpPr>
+          <p:cNvPr id="7" name="Rectangle 6"/>
+          <p:cNvSpPr/>
+          <p:nvPr/>
+        </p:nvSpPr>
+        <p:spPr>
+          <a:xfrm>
+            <a:off x="5364088" y="3473790"/>
+            <a:ext cx="2160240" cy="1107338"/>
+          </a:xfrm>
+          <a:prstGeom prst="rect">
+            <a:avLst/>
+          </a:prstGeom>
+          <a:noFill/>
+          <a:ln w="57150">
+            <a:solidFill>
+              <a:srgbClr val="FF0000"/>
+            </a:solidFill>
+          </a:ln>
+        </p:spPr>
+        <p:style>
+          <a:lnRef idx="2">
+            <a:schemeClr val="accent1">
+              <a:shade val="50000"/>
+            </a:schemeClr>
+          </a:lnRef>
+          <a:fillRef idx="1">
+            <a:schemeClr val="accent1"/>
+          </a:fillRef>
+          <a:effectRef idx="0">
+            <a:schemeClr val="accent1"/>
+          </a:effectRef>
+          <a:fontRef idx="minor">
+            <a:schemeClr val="lt1"/>
+          </a:fontRef>
+        </p:style>
+        <p:txBody>
+          <a:bodyPr rtlCol="0" anchor="ctr"/>
+          <a:lstStyle/>
+          <a:p>
+            <a:pPr algn="ctr"/>
+            <a:endParaRPr lang="en-CA"/>
+          </a:p>
+        </p:txBody>
+      </p:sp>
     </p:spTree>
     <p:extLst>
       <p:ext uri="{BB962C8B-B14F-4D97-AF65-F5344CB8AC3E}">
@@ -3948,7 +5663,7 @@
           </p:nvPr>
         </p:nvPicPr>
         <p:blipFill>
-          <a:blip r:embed="rId2" cstate="print">
+          <a:blip r:embed="rId3" cstate="print">
             <a:extLst>
               <a:ext uri="{28A0092B-C50C-407E-A947-70E740481C1C}">
                 <a14:useLocalDpi xmlns:a14="http://schemas.microsoft.com/office/drawing/2010/main" val="0"/>
@@ -3975,7 +5690,7 @@
           <p:nvPr/>
         </p:nvPicPr>
         <p:blipFill>
-          <a:blip r:embed="rId3" cstate="print">
+          <a:blip r:embed="rId4" cstate="print">
             <a:extLst>
               <a:ext uri="{28A0092B-C50C-407E-A947-70E740481C1C}">
                 <a14:useLocalDpi xmlns:a14="http://schemas.microsoft.com/office/drawing/2010/main" val="0"/>
@@ -4427,7 +6142,7 @@
           <p:nvPr/>
         </p:nvPicPr>
         <p:blipFill>
-          <a:blip r:embed="rId2" cstate="print">
+          <a:blip r:embed="rId3" cstate="print">
             <a:extLst>
               <a:ext uri="{28A0092B-C50C-407E-A947-70E740481C1C}">
                 <a14:useLocalDpi xmlns:a14="http://schemas.microsoft.com/office/drawing/2010/main" val="0"/>
@@ -4559,7 +6274,7 @@
           <p:nvPr/>
         </p:nvPicPr>
         <p:blipFill>
-          <a:blip r:embed="rId3" cstate="print">
+          <a:blip r:embed="rId4" cstate="print">
             <a:extLst>
               <a:ext uri="{28A0092B-C50C-407E-A947-70E740481C1C}">
                 <a14:useLocalDpi xmlns:a14="http://schemas.microsoft.com/office/drawing/2010/main" val="0"/>
@@ -4810,7 +6525,7 @@
           </p:nvPr>
         </p:nvPicPr>
         <p:blipFill>
-          <a:blip r:embed="rId2" cstate="print">
+          <a:blip r:embed="rId3" cstate="print">
             <a:extLst>
               <a:ext uri="{28A0092B-C50C-407E-A947-70E740481C1C}">
                 <a14:useLocalDpi xmlns:a14="http://schemas.microsoft.com/office/drawing/2010/main" val="0"/>
@@ -4839,7 +6554,7 @@
           </p:nvPr>
         </p:nvPicPr>
         <p:blipFill>
-          <a:blip r:embed="rId3" cstate="print">
+          <a:blip r:embed="rId4" cstate="print">
             <a:extLst>
               <a:ext uri="{28A0092B-C50C-407E-A947-70E740481C1C}">
                 <a14:useLocalDpi xmlns:a14="http://schemas.microsoft.com/office/drawing/2010/main" val="0"/>
@@ -5335,7 +7050,7 @@
           <p:nvPr/>
         </p:nvPicPr>
         <p:blipFill>
-          <a:blip r:embed="rId2">
+          <a:blip r:embed="rId3">
             <a:extLst>
               <a:ext uri="{28A0092B-C50C-407E-A947-70E740481C1C}">
                 <a14:useLocalDpi xmlns:a14="http://schemas.microsoft.com/office/drawing/2010/main" val="0"/>
@@ -5691,7 +7406,7 @@
           <p:nvPr/>
         </p:nvPicPr>
         <p:blipFill>
-          <a:blip r:embed="rId2">
+          <a:blip r:embed="rId3">
             <a:extLst>
               <a:ext uri="{28A0092B-C50C-407E-A947-70E740481C1C}">
                 <a14:useLocalDpi xmlns:a14="http://schemas.microsoft.com/office/drawing/2010/main" val="0"/>
@@ -5732,7 +7447,7 @@
           <p:nvPr/>
         </p:nvPicPr>
         <p:blipFill>
-          <a:blip r:embed="rId3" cstate="print">
+          <a:blip r:embed="rId4" cstate="print">
             <a:extLst>
               <a:ext uri="{28A0092B-C50C-407E-A947-70E740481C1C}">
                 <a14:useLocalDpi xmlns:a14="http://schemas.microsoft.com/office/drawing/2010/main" val="0"/>
@@ -5773,7 +7488,7 @@
           <p:nvPr/>
         </p:nvPicPr>
         <p:blipFill>
-          <a:blip r:embed="rId4">
+          <a:blip r:embed="rId5">
             <a:extLst>
               <a:ext uri="{28A0092B-C50C-407E-A947-70E740481C1C}">
                 <a14:useLocalDpi xmlns:a14="http://schemas.microsoft.com/office/drawing/2010/main" val="0"/>
@@ -5814,7 +7529,7 @@
           <p:nvPr/>
         </p:nvPicPr>
         <p:blipFill>
-          <a:blip r:embed="rId5">
+          <a:blip r:embed="rId6">
             <a:extLst>
               <a:ext uri="{28A0092B-C50C-407E-A947-70E740481C1C}">
                 <a14:useLocalDpi xmlns:a14="http://schemas.microsoft.com/office/drawing/2010/main" val="0"/>
@@ -5855,7 +7570,7 @@
           <p:nvPr/>
         </p:nvPicPr>
         <p:blipFill>
-          <a:blip r:embed="rId6">
+          <a:blip r:embed="rId7">
             <a:extLst>
               <a:ext uri="{28A0092B-C50C-407E-A947-70E740481C1C}">
                 <a14:useLocalDpi xmlns:a14="http://schemas.microsoft.com/office/drawing/2010/main" val="0"/>
@@ -6110,7 +7825,7 @@
           </p:nvPr>
         </p:nvPicPr>
         <p:blipFill>
-          <a:blip r:embed="rId2">
+          <a:blip r:embed="rId3">
             <a:extLst>
               <a:ext uri="{28A0092B-C50C-407E-A947-70E740481C1C}">
                 <a14:useLocalDpi xmlns:a14="http://schemas.microsoft.com/office/drawing/2010/main" val="0"/>
@@ -6575,4 +8290,265 @@
   <a:objectDefaults/>
   <a:extraClrSchemeLst/>
 </a:theme>
+</file>
+
+<file path=ppt/theme/theme2.xml><?xml version="1.0" encoding="utf-8"?>
+<a:theme xmlns:a="http://schemas.openxmlformats.org/drawingml/2006/main" name="Office Theme">
+  <a:themeElements>
+    <a:clrScheme name="Office">
+      <a:dk1>
+        <a:sysClr val="windowText" lastClr="000000"/>
+      </a:dk1>
+      <a:lt1>
+        <a:sysClr val="window" lastClr="FFFFFF"/>
+      </a:lt1>
+      <a:dk2>
+        <a:srgbClr val="44546A"/>
+      </a:dk2>
+      <a:lt2>
+        <a:srgbClr val="E7E6E6"/>
+      </a:lt2>
+      <a:accent1>
+        <a:srgbClr val="5B9BD5"/>
+      </a:accent1>
+      <a:accent2>
+        <a:srgbClr val="ED7D31"/>
+      </a:accent2>
+      <a:accent3>
+        <a:srgbClr val="A5A5A5"/>
+      </a:accent3>
+      <a:accent4>
+        <a:srgbClr val="FFC000"/>
+      </a:accent4>
+      <a:accent5>
+        <a:srgbClr val="4472C4"/>
+      </a:accent5>
+      <a:accent6>
+        <a:srgbClr val="70AD47"/>
+      </a:accent6>
+      <a:hlink>
+        <a:srgbClr val="0563C1"/>
+      </a:hlink>
+      <a:folHlink>
+        <a:srgbClr val="954F72"/>
+      </a:folHlink>
+    </a:clrScheme>
+    <a:fontScheme name="Office">
+      <a:majorFont>
+        <a:latin typeface="Calibri Light" panose="020F0302020204030204"/>
+        <a:ea typeface=""/>
+        <a:cs typeface=""/>
+        <a:font script="Jpan" typeface="ＭＳ Ｐゴシック"/>
+        <a:font script="Hang" typeface="맑은 고딕"/>
+        <a:font script="Hans" typeface="宋体"/>
+        <a:font script="Hant" typeface="新細明體"/>
+        <a:font script="Arab" typeface="Times New Roman"/>
+        <a:font script="Hebr" typeface="Times New Roman"/>
+        <a:font script="Thai" typeface="Angsana New"/>
+        <a:font script="Ethi" typeface="Nyala"/>
+        <a:font script="Beng" typeface="Vrinda"/>
+        <a:font script="Gujr" typeface="Shruti"/>
+        <a:font script="Khmr" typeface="MoolBoran"/>
+        <a:font script="Knda" typeface="Tunga"/>
+        <a:font script="Guru" typeface="Raavi"/>
+        <a:font script="Cans" typeface="Euphemia"/>
+        <a:font script="Cher" typeface="Plantagenet Cherokee"/>
+        <a:font script="Yiii" typeface="Microsoft Yi Baiti"/>
+        <a:font script="Tibt" typeface="Microsoft Himalaya"/>
+        <a:font script="Thaa" typeface="MV Boli"/>
+        <a:font script="Deva" typeface="Mangal"/>
+        <a:font script="Telu" typeface="Gautami"/>
+        <a:font script="Taml" typeface="Latha"/>
+        <a:font script="Syrc" typeface="Estrangelo Edessa"/>
+        <a:font script="Orya" typeface="Kalinga"/>
+        <a:font script="Mlym" typeface="Kartika"/>
+        <a:font script="Laoo" typeface="DokChampa"/>
+        <a:font script="Sinh" typeface="Iskoola Pota"/>
+        <a:font script="Mong" typeface="Mongolian Baiti"/>
+        <a:font script="Viet" typeface="Times New Roman"/>
+        <a:font script="Uigh" typeface="Microsoft Uighur"/>
+        <a:font script="Geor" typeface="Sylfaen"/>
+      </a:majorFont>
+      <a:minorFont>
+        <a:latin typeface="Calibri" panose="020F0502020204030204"/>
+        <a:ea typeface=""/>
+        <a:cs typeface=""/>
+        <a:font script="Jpan" typeface="ＭＳ Ｐゴシック"/>
+        <a:font script="Hang" typeface="맑은 고딕"/>
+        <a:font script="Hans" typeface="宋体"/>
+        <a:font script="Hant" typeface="新細明體"/>
+        <a:font script="Arab" typeface="Arial"/>
+        <a:font script="Hebr" typeface="Arial"/>
+        <a:font script="Thai" typeface="Cordia New"/>
+        <a:font script="Ethi" typeface="Nyala"/>
+        <a:font script="Beng" typeface="Vrinda"/>
+        <a:font script="Gujr" typeface="Shruti"/>
+        <a:font script="Khmr" typeface="DaunPenh"/>
+        <a:font script="Knda" typeface="Tunga"/>
+        <a:font script="Guru" typeface="Raavi"/>
+        <a:font script="Cans" typeface="Euphemia"/>
+        <a:font script="Cher" typeface="Plantagenet Cherokee"/>
+        <a:font script="Yiii" typeface="Microsoft Yi Baiti"/>
+        <a:font script="Tibt" typeface="Microsoft Himalaya"/>
+        <a:font script="Thaa" typeface="MV Boli"/>
+        <a:font script="Deva" typeface="Mangal"/>
+        <a:font script="Telu" typeface="Gautami"/>
+        <a:font script="Taml" typeface="Latha"/>
+        <a:font script="Syrc" typeface="Estrangelo Edessa"/>
+        <a:font script="Orya" typeface="Kalinga"/>
+        <a:font script="Mlym" typeface="Kartika"/>
+        <a:font script="Laoo" typeface="DokChampa"/>
+        <a:font script="Sinh" typeface="Iskoola Pota"/>
+        <a:font script="Mong" typeface="Mongolian Baiti"/>
+        <a:font script="Viet" typeface="Arial"/>
+        <a:font script="Uigh" typeface="Microsoft Uighur"/>
+        <a:font script="Geor" typeface="Sylfaen"/>
+      </a:minorFont>
+    </a:fontScheme>
+    <a:fmtScheme name="Office">
+      <a:fillStyleLst>
+        <a:solidFill>
+          <a:schemeClr val="phClr"/>
+        </a:solidFill>
+        <a:gradFill rotWithShape="1">
+          <a:gsLst>
+            <a:gs pos="0">
+              <a:schemeClr val="phClr">
+                <a:lumMod val="110000"/>
+                <a:satMod val="105000"/>
+                <a:tint val="67000"/>
+              </a:schemeClr>
+            </a:gs>
+            <a:gs pos="50000">
+              <a:schemeClr val="phClr">
+                <a:lumMod val="105000"/>
+                <a:satMod val="103000"/>
+                <a:tint val="73000"/>
+              </a:schemeClr>
+            </a:gs>
+            <a:gs pos="100000">
+              <a:schemeClr val="phClr">
+                <a:lumMod val="105000"/>
+                <a:satMod val="109000"/>
+                <a:tint val="81000"/>
+              </a:schemeClr>
+            </a:gs>
+          </a:gsLst>
+          <a:lin ang="5400000" scaled="0"/>
+        </a:gradFill>
+        <a:gradFill rotWithShape="1">
+          <a:gsLst>
+            <a:gs pos="0">
+              <a:schemeClr val="phClr">
+                <a:satMod val="103000"/>
+                <a:lumMod val="102000"/>
+                <a:tint val="94000"/>
+              </a:schemeClr>
+            </a:gs>
+            <a:gs pos="50000">
+              <a:schemeClr val="phClr">
+                <a:satMod val="110000"/>
+                <a:lumMod val="100000"/>
+                <a:shade val="100000"/>
+              </a:schemeClr>
+            </a:gs>
+            <a:gs pos="100000">
+              <a:schemeClr val="phClr">
+                <a:lumMod val="99000"/>
+                <a:satMod val="120000"/>
+                <a:shade val="78000"/>
+              </a:schemeClr>
+            </a:gs>
+          </a:gsLst>
+          <a:lin ang="5400000" scaled="0"/>
+        </a:gradFill>
+      </a:fillStyleLst>
+      <a:lnStyleLst>
+        <a:ln w="6350" cap="flat" cmpd="sng" algn="ctr">
+          <a:solidFill>
+            <a:schemeClr val="phClr"/>
+          </a:solidFill>
+          <a:prstDash val="solid"/>
+          <a:miter lim="800000"/>
+        </a:ln>
+        <a:ln w="12700" cap="flat" cmpd="sng" algn="ctr">
+          <a:solidFill>
+            <a:schemeClr val="phClr"/>
+          </a:solidFill>
+          <a:prstDash val="solid"/>
+          <a:miter lim="800000"/>
+        </a:ln>
+        <a:ln w="19050" cap="flat" cmpd="sng" algn="ctr">
+          <a:solidFill>
+            <a:schemeClr val="phClr"/>
+          </a:solidFill>
+          <a:prstDash val="solid"/>
+          <a:miter lim="800000"/>
+        </a:ln>
+      </a:lnStyleLst>
+      <a:effectStyleLst>
+        <a:effectStyle>
+          <a:effectLst/>
+        </a:effectStyle>
+        <a:effectStyle>
+          <a:effectLst/>
+        </a:effectStyle>
+        <a:effectStyle>
+          <a:effectLst>
+            <a:outerShdw blurRad="57150" dist="19050" dir="5400000" algn="ctr" rotWithShape="0">
+              <a:srgbClr val="000000">
+                <a:alpha val="63000"/>
+              </a:srgbClr>
+            </a:outerShdw>
+          </a:effectLst>
+        </a:effectStyle>
+      </a:effectStyleLst>
+      <a:bgFillStyleLst>
+        <a:solidFill>
+          <a:schemeClr val="phClr"/>
+        </a:solidFill>
+        <a:solidFill>
+          <a:schemeClr val="phClr">
+            <a:tint val="95000"/>
+            <a:satMod val="170000"/>
+          </a:schemeClr>
+        </a:solidFill>
+        <a:gradFill rotWithShape="1">
+          <a:gsLst>
+            <a:gs pos="0">
+              <a:schemeClr val="phClr">
+                <a:tint val="93000"/>
+                <a:satMod val="150000"/>
+                <a:shade val="98000"/>
+                <a:lumMod val="102000"/>
+              </a:schemeClr>
+            </a:gs>
+            <a:gs pos="50000">
+              <a:schemeClr val="phClr">
+                <a:tint val="98000"/>
+                <a:satMod val="130000"/>
+                <a:shade val="90000"/>
+                <a:lumMod val="103000"/>
+              </a:schemeClr>
+            </a:gs>
+            <a:gs pos="100000">
+              <a:schemeClr val="phClr">
+                <a:shade val="63000"/>
+                <a:satMod val="120000"/>
+              </a:schemeClr>
+            </a:gs>
+          </a:gsLst>
+          <a:lin ang="5400000" scaled="0"/>
+        </a:gradFill>
+      </a:bgFillStyleLst>
+    </a:fmtScheme>
+  </a:themeElements>
+  <a:objectDefaults/>
+  <a:extraClrSchemeLst/>
+  <a:extLst>
+    <a:ext uri="{05A4C25C-085E-4340-85A3-A5531E510DB2}">
+      <thm15:themeFamily xmlns:thm15="http://schemas.microsoft.com/office/thememl/2012/main" name="Office Theme" id="{62F939B6-93AF-4DB8-9C6B-D6C7DFDC589F}" vid="{4A3C46E8-61CC-4603-A589-7422A47A8E4A}"/>
+    </a:ext>
+  </a:extLst>
+</a:theme>
 </file>
</xml_diff>